<commit_message>
poster with difference cross validation
</commit_message>
<xml_diff>
--- a/project/Poster_2.pptx
+++ b/project/Poster_2.pptx
@@ -5021,7 +5021,7 @@
           <p:nvPr>
             <p:extLst>
               <p:ext uri="{D42A27DB-BD31-4B8C-83A1-F6EECF244321}">
-                <p14:modId xmlns:p14="http://schemas.microsoft.com/office/powerpoint/2010/main" val="3028087970"/>
+                <p14:modId xmlns:p14="http://schemas.microsoft.com/office/powerpoint/2010/main" val="1807255320"/>
               </p:ext>
             </p:extLst>
           </p:nvPr>
@@ -5142,7 +5142,7 @@
                     <a:p>
                       <a:r>
                         <a:rPr lang="fr-FR" sz="5400" dirty="0" smtClean="0"/>
-                        <a:t>1.0</a:t>
+                        <a:t>0.92</a:t>
                       </a:r>
                       <a:endParaRPr lang="fr-FR" sz="5400" dirty="0"/>
                     </a:p>
@@ -5204,7 +5204,7 @@
                     <a:p>
                       <a:r>
                         <a:rPr lang="fr-FR" sz="5400" dirty="0" smtClean="0"/>
-                        <a:t>0.64</a:t>
+                        <a:t>0.22</a:t>
                       </a:r>
                       <a:endParaRPr lang="fr-FR" sz="5400" dirty="0"/>
                     </a:p>
@@ -5232,7 +5232,7 @@
                     <a:p>
                       <a:r>
                         <a:rPr lang="fr-FR" sz="5400" dirty="0" smtClean="0"/>
-                        <a:t>0.61</a:t>
+                        <a:t>0.16</a:t>
                       </a:r>
                       <a:endParaRPr lang="fr-FR" sz="5400" dirty="0"/>
                     </a:p>
@@ -5268,11 +5268,15 @@
             <a:pPr algn="just"/>
             <a:r>
               <a:rPr lang="en-US" sz="5400" dirty="0" smtClean="0"/>
-              <a:t>For the max threshold and a window size of 55 samples with </a:t>
+              <a:t>For the max threshold and a window size of </a:t>
             </a:r>
             <a:r>
               <a:rPr lang="en-US" sz="5400" dirty="0" smtClean="0"/>
-              <a:t>randomly</a:t>
+              <a:t>40 samples </a:t>
+            </a:r>
+            <a:r>
+              <a:rPr lang="en-US" sz="5400" dirty="0" smtClean="0"/>
+              <a:t>with randomly</a:t>
             </a:r>
             <a:r>
               <a:rPr lang="fr-FR" sz="5400" dirty="0" smtClean="0"/>
@@ -5288,11 +5292,7 @@
             </a:r>
             <a:r>
               <a:rPr lang="en-US" sz="5400" dirty="0" smtClean="0"/>
-              <a:t>artifacts </a:t>
-            </a:r>
-            <a:r>
-              <a:rPr lang="en-US" sz="5400" dirty="0" smtClean="0"/>
-              <a:t>we have an average loss in the reconstructed dataset of </a:t>
+              <a:t>artifacts we have an average loss in the reconstructed dataset of </a:t>
             </a:r>
             <a:r>
               <a:rPr lang="fr-FR" sz="5400" dirty="0" smtClean="0"/>
@@ -5304,11 +5304,7 @@
             </a:r>
             <a:r>
               <a:rPr lang="fr-FR" sz="5400" dirty="0" smtClean="0"/>
-              <a:t> </a:t>
-            </a:r>
-            <a:r>
-              <a:rPr lang="fr-FR" sz="5400" dirty="0" smtClean="0"/>
-              <a:t>are </a:t>
+              <a:t> are </a:t>
             </a:r>
             <a:r>
               <a:rPr lang="en-US" sz="5400" dirty="0" smtClean="0"/>
@@ -5318,7 +5314,6 @@
               <a:rPr lang="fr-FR" sz="5400" dirty="0" smtClean="0"/>
               <a:t>. </a:t>
             </a:r>
-            <a:endParaRPr lang="fr-FR" sz="5400" dirty="0" smtClean="0"/>
           </a:p>
           <a:p>
             <a:pPr algn="just"/>
@@ -5443,8 +5438,8 @@
         </p:blipFill>
         <p:spPr>
           <a:xfrm>
-            <a:off x="34911396" y="3240560"/>
-            <a:ext cx="15661921" cy="11451707"/>
+            <a:off x="34748216" y="3240560"/>
+            <a:ext cx="15652268" cy="11451707"/>
           </a:xfrm>
           <a:prstGeom prst="rect">
             <a:avLst/>

</xml_diff>

<commit_message>
logbook completed and poster changed
</commit_message>
<xml_diff>
--- a/project/Poster_2.pptx
+++ b/project/Poster_2.pptx
@@ -224,7 +224,7 @@
             <a:fld id="{0AFA913D-761F-4878-80D8-E9300E7F85AB}" type="datetimeFigureOut">
               <a:rPr lang="da-DK" smtClean="0"/>
               <a:pPr/>
-              <a:t>16-05-2016</a:t>
+              <a:t>18-05-2016</a:t>
             </a:fld>
             <a:endParaRPr lang="da-DK"/>
           </a:p>
@@ -391,7 +391,7 @@
             <a:fld id="{DDA39AFA-2EAA-4FF2-B985-4633D13C63BD}" type="datetimeFigureOut">
               <a:rPr lang="da-DK" smtClean="0"/>
               <a:pPr/>
-              <a:t>16-05-2016</a:t>
+              <a:t>18-05-2016</a:t>
             </a:fld>
             <a:endParaRPr lang="da-DK"/>
           </a:p>
@@ -932,7 +932,7 @@
             <a:fld id="{CDD96A3E-44D5-40E6-B2BE-3B95884D8F7D}" type="datetimeFigureOut">
               <a:rPr lang="da-DK" smtClean="0"/>
               <a:pPr/>
-              <a:t>16-05-2016</a:t>
+              <a:t>18-05-2016</a:t>
             </a:fld>
             <a:endParaRPr lang="da-DK"/>
           </a:p>
@@ -1099,7 +1099,7 @@
             <a:fld id="{CDD96A3E-44D5-40E6-B2BE-3B95884D8F7D}" type="datetimeFigureOut">
               <a:rPr lang="da-DK" smtClean="0"/>
               <a:pPr/>
-              <a:t>16-05-2016</a:t>
+              <a:t>18-05-2016</a:t>
             </a:fld>
             <a:endParaRPr lang="da-DK"/>
           </a:p>
@@ -1276,7 +1276,7 @@
             <a:fld id="{CDD96A3E-44D5-40E6-B2BE-3B95884D8F7D}" type="datetimeFigureOut">
               <a:rPr lang="da-DK" smtClean="0"/>
               <a:pPr/>
-              <a:t>16-05-2016</a:t>
+              <a:t>18-05-2016</a:t>
             </a:fld>
             <a:endParaRPr lang="da-DK"/>
           </a:p>
@@ -1443,7 +1443,7 @@
             <a:fld id="{CDD96A3E-44D5-40E6-B2BE-3B95884D8F7D}" type="datetimeFigureOut">
               <a:rPr lang="da-DK" smtClean="0"/>
               <a:pPr/>
-              <a:t>16-05-2016</a:t>
+              <a:t>18-05-2016</a:t>
             </a:fld>
             <a:endParaRPr lang="da-DK"/>
           </a:p>
@@ -1686,7 +1686,7 @@
             <a:fld id="{CDD96A3E-44D5-40E6-B2BE-3B95884D8F7D}" type="datetimeFigureOut">
               <a:rPr lang="da-DK" smtClean="0"/>
               <a:pPr/>
-              <a:t>16-05-2016</a:t>
+              <a:t>18-05-2016</a:t>
             </a:fld>
             <a:endParaRPr lang="da-DK"/>
           </a:p>
@@ -1971,7 +1971,7 @@
             <a:fld id="{CDD96A3E-44D5-40E6-B2BE-3B95884D8F7D}" type="datetimeFigureOut">
               <a:rPr lang="da-DK" smtClean="0"/>
               <a:pPr/>
-              <a:t>16-05-2016</a:t>
+              <a:t>18-05-2016</a:t>
             </a:fld>
             <a:endParaRPr lang="da-DK"/>
           </a:p>
@@ -2395,7 +2395,7 @@
             <a:fld id="{CDD96A3E-44D5-40E6-B2BE-3B95884D8F7D}" type="datetimeFigureOut">
               <a:rPr lang="da-DK" smtClean="0"/>
               <a:pPr/>
-              <a:t>16-05-2016</a:t>
+              <a:t>18-05-2016</a:t>
             </a:fld>
             <a:endParaRPr lang="da-DK"/>
           </a:p>
@@ -2510,7 +2510,7 @@
             <a:fld id="{CDD96A3E-44D5-40E6-B2BE-3B95884D8F7D}" type="datetimeFigureOut">
               <a:rPr lang="da-DK" smtClean="0"/>
               <a:pPr/>
-              <a:t>16-05-2016</a:t>
+              <a:t>18-05-2016</a:t>
             </a:fld>
             <a:endParaRPr lang="da-DK"/>
           </a:p>
@@ -2602,7 +2602,7 @@
             <a:fld id="{CDD96A3E-44D5-40E6-B2BE-3B95884D8F7D}" type="datetimeFigureOut">
               <a:rPr lang="da-DK" smtClean="0"/>
               <a:pPr/>
-              <a:t>16-05-2016</a:t>
+              <a:t>18-05-2016</a:t>
             </a:fld>
             <a:endParaRPr lang="da-DK"/>
           </a:p>
@@ -2876,7 +2876,7 @@
             <a:fld id="{CDD96A3E-44D5-40E6-B2BE-3B95884D8F7D}" type="datetimeFigureOut">
               <a:rPr lang="da-DK" smtClean="0"/>
               <a:pPr/>
-              <a:t>16-05-2016</a:t>
+              <a:t>18-05-2016</a:t>
             </a:fld>
             <a:endParaRPr lang="da-DK"/>
           </a:p>
@@ -3126,7 +3126,7 @@
             <a:fld id="{CDD96A3E-44D5-40E6-B2BE-3B95884D8F7D}" type="datetimeFigureOut">
               <a:rPr lang="da-DK" smtClean="0"/>
               <a:pPr/>
-              <a:t>16-05-2016</a:t>
+              <a:t>18-05-2016</a:t>
             </a:fld>
             <a:endParaRPr lang="da-DK"/>
           </a:p>
@@ -3336,7 +3336,7 @@
             <a:fld id="{CDD96A3E-44D5-40E6-B2BE-3B95884D8F7D}" type="datetimeFigureOut">
               <a:rPr lang="da-DK" smtClean="0"/>
               <a:pPr/>
-              <a:t>16-05-2016</a:t>
+              <a:t>18-05-2016</a:t>
             </a:fld>
             <a:endParaRPr lang="da-DK"/>
           </a:p>
@@ -3707,36 +3707,6 @@
           <a:chExt cx="0" cy="0"/>
         </a:xfrm>
       </p:grpSpPr>
-      <p:pic>
-        <p:nvPicPr>
-          <p:cNvPr id="88" name="Image 87"/>
-          <p:cNvPicPr>
-            <a:picLocks noChangeAspect="1"/>
-          </p:cNvPicPr>
-          <p:nvPr/>
-        </p:nvPicPr>
-        <p:blipFill>
-          <a:blip r:embed="rId3">
-            <a:extLst>
-              <a:ext uri="{28A0092B-C50C-407E-A947-70E740481C1C}">
-                <a14:useLocalDpi xmlns:a14="http://schemas.microsoft.com/office/drawing/2010/main" val="0"/>
-              </a:ext>
-            </a:extLst>
-          </a:blip>
-          <a:stretch>
-            <a:fillRect/>
-          </a:stretch>
-        </p:blipFill>
-        <p:spPr>
-          <a:xfrm>
-            <a:off x="13267535" y="4306281"/>
-            <a:ext cx="20569991" cy="7282816"/>
-          </a:xfrm>
-          <a:prstGeom prst="rect">
-            <a:avLst/>
-          </a:prstGeom>
-        </p:spPr>
-      </p:pic>
       <p:sp>
         <p:nvSpPr>
           <p:cNvPr id="2" name="Titel 1"/>
@@ -3750,7 +3720,7 @@
         <p:spPr>
           <a:xfrm>
             <a:off x="0" y="-12305"/>
-            <a:ext cx="51206399" cy="2587970"/>
+            <a:ext cx="51206399" cy="2070083"/>
           </a:xfrm>
           <a:solidFill>
             <a:srgbClr val="C51137"/>
@@ -3761,7 +3731,7 @@
         </p:spPr>
         <p:txBody>
           <a:bodyPr>
-            <a:normAutofit/>
+            <a:normAutofit fontScale="90000"/>
           </a:bodyPr>
           <a:lstStyle/>
           <a:p>
@@ -3862,7 +3832,7 @@
         </p:nvCxnSpPr>
         <p:spPr>
           <a:xfrm>
-            <a:off x="12898916" y="3691465"/>
+            <a:off x="15145159" y="2826701"/>
             <a:ext cx="0" cy="23436000"/>
           </a:xfrm>
           <a:prstGeom prst="line">
@@ -3897,7 +3867,7 @@
         </p:nvGrpSpPr>
         <p:grpSpPr>
           <a:xfrm>
-            <a:off x="308636" y="7667054"/>
+            <a:off x="308636" y="7273008"/>
             <a:ext cx="11819196" cy="1164322"/>
             <a:chOff x="308636" y="8800325"/>
             <a:chExt cx="11819196" cy="1164322"/>
@@ -4048,12 +4018,16 @@
                 <a:lstStyle/>
                 <a:p>
                   <a:r>
-                    <a:rPr lang="en-GB" sz="6240" dirty="0">
+                    <a:rPr lang="en-GB" sz="6240" dirty="0" smtClean="0">
                       <a:latin typeface="Century Gothic"/>
                       <a:cs typeface="Century Gothic"/>
                     </a:rPr>
-                    <a:t>Methods</a:t>
+                    <a:t>Method</a:t>
                   </a:r>
+                  <a:endParaRPr lang="en-GB" sz="6240" dirty="0">
+                    <a:latin typeface="Century Gothic"/>
+                    <a:cs typeface="Century Gothic"/>
+                  </a:endParaRPr>
                 </a:p>
               </p:txBody>
             </p:sp>
@@ -4100,7 +4074,7 @@
         </p:nvGrpSpPr>
         <p:grpSpPr>
           <a:xfrm>
-            <a:off x="470675" y="2952528"/>
+            <a:off x="470675" y="2232448"/>
             <a:ext cx="5644748" cy="1164322"/>
             <a:chOff x="1187308" y="6424551"/>
             <a:chExt cx="5992389" cy="1224000"/>
@@ -4253,7 +4227,7 @@
         </p:nvCxnSpPr>
         <p:spPr>
           <a:xfrm>
-            <a:off x="5254480" y="3528592"/>
+            <a:off x="5254480" y="2808512"/>
             <a:ext cx="6873352" cy="85267"/>
           </a:xfrm>
           <a:prstGeom prst="line">
@@ -4288,10 +4262,10 @@
         </p:nvGrpSpPr>
         <p:grpSpPr>
           <a:xfrm>
-            <a:off x="13505856" y="2869200"/>
-            <a:ext cx="19514168" cy="1164634"/>
-            <a:chOff x="13505856" y="2868014"/>
-            <a:chExt cx="19514168" cy="1164634"/>
+            <a:off x="15597566" y="2413907"/>
+            <a:ext cx="17670086" cy="1164634"/>
+            <a:chOff x="15637970" y="2794820"/>
+            <a:chExt cx="17670086" cy="1164634"/>
           </a:xfrm>
         </p:grpSpPr>
         <p:grpSp>
@@ -4302,10 +4276,10 @@
           </p:nvGrpSpPr>
           <p:grpSpPr>
             <a:xfrm>
-              <a:off x="13505856" y="2868014"/>
-              <a:ext cx="5644748" cy="1164634"/>
-              <a:chOff x="1115870" y="9451997"/>
-              <a:chExt cx="7276472" cy="1524304"/>
+              <a:off x="15637970" y="2794820"/>
+              <a:ext cx="5644750" cy="1164634"/>
+              <a:chOff x="3864305" y="9356199"/>
+              <a:chExt cx="7276474" cy="1524304"/>
             </a:xfrm>
           </p:grpSpPr>
           <p:sp>
@@ -4318,8 +4292,8 @@
             </p:nvSpPr>
             <p:spPr>
               <a:xfrm>
-                <a:off x="1115870" y="9452407"/>
-                <a:ext cx="1486286" cy="1523894"/>
+                <a:off x="3864305" y="9356609"/>
+                <a:ext cx="1486285" cy="1523894"/>
               </a:xfrm>
               <a:prstGeom prst="donut">
                 <a:avLst>
@@ -4372,7 +4346,7 @@
             </p:nvSpPr>
             <p:spPr>
               <a:xfrm>
-                <a:off x="2677300" y="9451997"/>
+                <a:off x="5425737" y="9356199"/>
                 <a:ext cx="5715042" cy="1377666"/>
               </a:xfrm>
               <a:prstGeom prst="rect">
@@ -4408,7 +4382,7 @@
           </p:nvSpPr>
           <p:spPr>
             <a:xfrm>
-              <a:off x="13777666" y="2910168"/>
+              <a:off x="15938693" y="2839851"/>
               <a:ext cx="807523" cy="1047595"/>
             </a:xfrm>
             <a:prstGeom prst="rect">
@@ -4440,8 +4414,8 @@
           </p:nvCxnSpPr>
           <p:spPr>
             <a:xfrm flipV="1">
-              <a:off x="17560445" y="3324206"/>
-              <a:ext cx="15459579" cy="42104"/>
+              <a:off x="19868951" y="3324206"/>
+              <a:ext cx="13439105" cy="53087"/>
             </a:xfrm>
             <a:prstGeom prst="line">
               <a:avLst/>
@@ -4477,7 +4451,7 @@
           <p:nvPr/>
         </p:nvPicPr>
         <p:blipFill>
-          <a:blip r:embed="rId4" cstate="print">
+          <a:blip r:embed="rId3" cstate="print">
             <a:extLst>
               <a:ext uri="{28A0092B-C50C-407E-A947-70E740481C1C}">
                 <a14:useLocalDpi xmlns:a14="http://schemas.microsoft.com/office/drawing/2010/main" val="0"/>
@@ -4490,7 +4464,7 @@
         </p:blipFill>
         <p:spPr>
           <a:xfrm>
-            <a:off x="328392" y="26715168"/>
+            <a:off x="-1968214" y="24323726"/>
             <a:ext cx="1239698" cy="1795546"/>
           </a:xfrm>
           <a:prstGeom prst="rect">
@@ -4506,7 +4480,7 @@
         </p:nvGrpSpPr>
         <p:grpSpPr>
           <a:xfrm>
-            <a:off x="34748216" y="25364931"/>
+            <a:off x="35993239" y="23834848"/>
             <a:ext cx="15061831" cy="2070317"/>
             <a:chOff x="36548622" y="19938977"/>
             <a:chExt cx="15061831" cy="2070317"/>
@@ -4680,7 +4654,7 @@
           <p:nvPr/>
         </p:nvPicPr>
         <p:blipFill>
-          <a:blip r:embed="rId5">
+          <a:blip r:embed="rId4">
             <a:extLst>
               <a:ext uri="{28A0092B-C50C-407E-A947-70E740481C1C}">
                 <a14:useLocalDpi xmlns:a14="http://schemas.microsoft.com/office/drawing/2010/main" val="0"/>
@@ -4693,8 +4667,8 @@
         </p:blipFill>
         <p:spPr>
           <a:xfrm>
-            <a:off x="13267534" y="12338824"/>
-            <a:ext cx="20569991" cy="7155913"/>
+            <a:off x="15597565" y="13529738"/>
+            <a:ext cx="19234163" cy="5264550"/>
           </a:xfrm>
           <a:prstGeom prst="rect">
             <a:avLst/>
@@ -4710,7 +4684,7 @@
           <p:nvPr/>
         </p:nvPicPr>
         <p:blipFill>
-          <a:blip r:embed="rId6">
+          <a:blip r:embed="rId5">
             <a:extLst>
               <a:ext uri="{28A0092B-C50C-407E-A947-70E740481C1C}">
                 <a14:useLocalDpi xmlns:a14="http://schemas.microsoft.com/office/drawing/2010/main" val="0"/>
@@ -4723,8 +4697,8 @@
         </p:blipFill>
         <p:spPr>
           <a:xfrm>
-            <a:off x="13193826" y="20244464"/>
-            <a:ext cx="20643699" cy="7337672"/>
+            <a:off x="15597565" y="21964971"/>
+            <a:ext cx="19366675" cy="5398269"/>
           </a:xfrm>
           <a:prstGeom prst="rect">
             <a:avLst/>
@@ -4739,8 +4713,8 @@
         </p:nvSpPr>
         <p:spPr>
           <a:xfrm>
-            <a:off x="585866" y="4484092"/>
-            <a:ext cx="11759707" cy="2585323"/>
+            <a:off x="585866" y="3384576"/>
+            <a:ext cx="14209250" cy="3600986"/>
           </a:xfrm>
           <a:prstGeom prst="rect">
             <a:avLst/>
@@ -4754,10 +4728,10 @@
           <a:p>
             <a:pPr algn="just"/>
             <a:r>
-              <a:rPr lang="en-US" sz="5400" dirty="0" smtClean="0"/>
-              <a:t>Our purpose is to remove noise from EEG data, in order to allow for real-time signal analysis.</a:t>
-            </a:r>
-            <a:endParaRPr lang="en-US" sz="5400" dirty="0"/>
+              <a:rPr lang="en-US" sz="3800" dirty="0" smtClean="0"/>
+              <a:t>Our purpose is to remove noise from EEG data, in order to allow for real-time signal analysis. The objective is to reproduce results from a method using principal component analysis (PCA) that has been successful in previous studies [1]. The EEG is typically noised by artifacts produced by patient’s muscular movements such as eye blinking or head movement. </a:t>
+            </a:r>
+            <a:endParaRPr lang="en-US" sz="3800" dirty="0"/>
           </a:p>
         </p:txBody>
       </p:sp>
@@ -4769,8 +4743,8 @@
         </p:nvSpPr>
         <p:spPr>
           <a:xfrm>
-            <a:off x="585866" y="9353346"/>
-            <a:ext cx="11759707" cy="16712267"/>
+            <a:off x="366365" y="8425136"/>
+            <a:ext cx="14498173" cy="21144250"/>
           </a:xfrm>
           <a:prstGeom prst="rect">
             <a:avLst/>
@@ -4784,86 +4758,161 @@
           <a:p>
             <a:pPr algn="just"/>
             <a:r>
-              <a:rPr lang="en-US" sz="5400" dirty="0"/>
-              <a:t>We use PCA to identify components with </a:t>
-            </a:r>
-            <a:r>
-              <a:rPr lang="en-US" sz="5400" dirty="0" smtClean="0"/>
-              <a:t>unusually </a:t>
-            </a:r>
-            <a:r>
-              <a:rPr lang="en-US" sz="5400" dirty="0"/>
-              <a:t>large eigenvalues. If the eigenvalue is above the threshold found during calibration, there should be an artifact in that component and we try to remove it</a:t>
-            </a:r>
-            <a:r>
-              <a:rPr lang="en-US" sz="5400" dirty="0" smtClean="0"/>
+              <a:rPr lang="en-US" sz="3800" dirty="0"/>
+              <a:t>During real-time signal analysis data will be treated in small time windows. We slice our dataset into similar small windows, in order to simulate this </a:t>
+            </a:r>
+            <a:r>
+              <a:rPr lang="en-US" sz="3800" dirty="0" smtClean="0"/>
+              <a:t>behavior.</a:t>
+            </a:r>
+          </a:p>
+          <a:p>
+            <a:pPr algn="just"/>
+            <a:endParaRPr lang="en-US" sz="3800" dirty="0"/>
+          </a:p>
+          <a:p>
+            <a:pPr algn="just"/>
+            <a:r>
+              <a:rPr lang="en-US" sz="3800" dirty="0"/>
+              <a:t>Given a window of multi-channel EEG input, we subtract the means of each channel in order to normalize. We calculate the eigenvectors and eigenvalues from the covariance of the window. We keep the eigenvectors, whose eigenvalues are below a certain threshold and discard the ones above. Components with eigenvalues above the threshold are likely to represent artifacts, since artifacts will increase variance </a:t>
+            </a:r>
+            <a:r>
+              <a:rPr lang="en-US" sz="3800" dirty="0" smtClean="0"/>
+              <a:t>significantly</a:t>
+            </a:r>
+            <a:r>
+              <a:rPr lang="en-US" sz="3800" dirty="0"/>
+              <a:t>. We project the window onto the remaining eigenvectors and then back into the original channel space. Lastly we add the subtracted means</a:t>
+            </a:r>
+            <a:r>
+              <a:rPr lang="en-US" sz="3800" dirty="0" smtClean="0"/>
               <a:t>.</a:t>
             </a:r>
           </a:p>
           <a:p>
             <a:pPr algn="just"/>
-            <a:endParaRPr lang="en-US" sz="5400" dirty="0"/>
+            <a:endParaRPr lang="en-US" sz="3800" dirty="0" smtClean="0"/>
           </a:p>
           <a:p>
             <a:pPr algn="just"/>
             <a:r>
-              <a:rPr lang="en-US" sz="5400" dirty="0"/>
-              <a:t>To compute the threshold for rejecting components we use a clean dataset as a training set. We calibrate the threshold on the first 20% of the dataset and then add simulated artifacts to the rest of it</a:t>
-            </a:r>
-            <a:r>
-              <a:rPr lang="en-US" sz="5400" dirty="0" smtClean="0"/>
-              <a:t>.</a:t>
-            </a:r>
+              <a:rPr lang="en-US" sz="3800" dirty="0" smtClean="0"/>
+              <a:t> </a:t>
+            </a:r>
+            <a:r>
+              <a:rPr lang="en-US" sz="3800" dirty="0"/>
+              <a:t>The eigenvalue threshold is chosen from a calibration period on the input source, where we assume all windows of data to be artifact free. We calculate the eigenvectors and eigenvalues of the artifact-free windows, and based on these eigenvalues we can calculate the following three different eigenvalue thresholds: </a:t>
+            </a:r>
+            <a:endParaRPr lang="en-US" sz="3800" dirty="0" smtClean="0"/>
           </a:p>
           <a:p>
             <a:pPr algn="just"/>
-            <a:endParaRPr lang="en-US" sz="5400" dirty="0"/>
+            <a:endParaRPr lang="en-US" sz="3800" dirty="0" smtClean="0"/>
+          </a:p>
+          <a:p>
+            <a:pPr marL="571500" indent="-571500" algn="just">
+              <a:buFont typeface="Arial" panose="020B0604020202020204" pitchFamily="34" charset="0"/>
+              <a:buChar char="•"/>
+            </a:pPr>
+            <a:r>
+              <a:rPr lang="en-US" sz="3800" dirty="0" smtClean="0"/>
+              <a:t>The </a:t>
+            </a:r>
+            <a:r>
+              <a:rPr lang="en-US" sz="3800" dirty="0"/>
+              <a:t>maximum eigenvalue of all the calibration windows. </a:t>
+            </a:r>
+            <a:r>
+              <a:rPr lang="en-US" sz="3800" dirty="0" smtClean="0"/>
+              <a:t>We </a:t>
+            </a:r>
+            <a:r>
+              <a:rPr lang="en-US" sz="3800" dirty="0"/>
+              <a:t>expect to only reject components representing artifacts, since their variance is assumed to be above the variances found during calibration. </a:t>
+            </a:r>
+            <a:endParaRPr lang="en-US" sz="3800" dirty="0" smtClean="0"/>
+          </a:p>
+          <a:p>
+            <a:pPr marL="571500" indent="-571500" algn="just">
+              <a:buFont typeface="Arial" panose="020B0604020202020204" pitchFamily="34" charset="0"/>
+              <a:buChar char="•"/>
+            </a:pPr>
+            <a:r>
+              <a:rPr lang="en-US" sz="3800" dirty="0" smtClean="0"/>
+              <a:t>The </a:t>
+            </a:r>
+            <a:r>
+              <a:rPr lang="en-US" sz="3800" dirty="0"/>
+              <a:t>average eigenvalue of all the calibration </a:t>
+            </a:r>
+            <a:r>
+              <a:rPr lang="en-US" sz="3800" dirty="0" smtClean="0"/>
+              <a:t>windows. We </a:t>
+            </a:r>
+            <a:r>
+              <a:rPr lang="en-US" sz="3800" dirty="0"/>
+              <a:t>expect to reject all components representing artifacts, with the risk of also rejecting some components not representing artifacts. </a:t>
+            </a:r>
+            <a:endParaRPr lang="en-US" sz="3800" dirty="0" smtClean="0"/>
+          </a:p>
+          <a:p>
+            <a:pPr marL="571500" indent="-571500" algn="just">
+              <a:buFont typeface="Arial" panose="020B0604020202020204" pitchFamily="34" charset="0"/>
+              <a:buChar char="•"/>
+            </a:pPr>
+            <a:r>
+              <a:rPr lang="en-US" sz="3800" dirty="0" smtClean="0"/>
+              <a:t>The </a:t>
+            </a:r>
+            <a:r>
+              <a:rPr lang="en-US" sz="3800" dirty="0"/>
+              <a:t>average of the largest eigenvalue in each calibration window. </a:t>
+            </a:r>
+            <a:r>
+              <a:rPr lang="en-US" sz="3800" dirty="0" smtClean="0"/>
+              <a:t>We </a:t>
+            </a:r>
+            <a:r>
+              <a:rPr lang="en-US" sz="3800" dirty="0"/>
+              <a:t>expect similar </a:t>
+            </a:r>
+            <a:r>
+              <a:rPr lang="en-US" sz="3800" dirty="0" smtClean="0"/>
+              <a:t>behavior </a:t>
+            </a:r>
+            <a:r>
+              <a:rPr lang="en-US" sz="3800" dirty="0"/>
+              <a:t>to that of the maximum eigenvalue threshold, with the advantage of evening out accidental high-variance during calibration and the disadvantage of the risk of rejecting some components not representing artifacts. </a:t>
+            </a:r>
+            <a:endParaRPr lang="en-US" sz="3800" dirty="0" smtClean="0"/>
           </a:p>
           <a:p>
             <a:pPr algn="just"/>
-            <a:r>
-              <a:rPr lang="en-US" sz="5400" dirty="0" smtClean="0"/>
-              <a:t>We </a:t>
-            </a:r>
-            <a:r>
-              <a:rPr lang="en-US" sz="5400" dirty="0"/>
-              <a:t>use three different kind of threshold: </a:t>
-            </a:r>
-          </a:p>
-          <a:p>
-            <a:pPr marL="171450" indent="-171450" algn="just">
-              <a:buFontTx/>
-              <a:buChar char="-"/>
-            </a:pPr>
-            <a:r>
-              <a:rPr lang="en-US" sz="5400" dirty="0"/>
-              <a:t>The maximum eigenvalue found in the windows of the training set</a:t>
-            </a:r>
-          </a:p>
-          <a:p>
-            <a:pPr marL="171450" indent="-171450" algn="just">
-              <a:buFontTx/>
-              <a:buChar char="-"/>
-            </a:pPr>
-            <a:r>
-              <a:rPr lang="en-US" sz="5400" dirty="0"/>
-              <a:t>The average of the eigenvalues of the windows of the training set</a:t>
-            </a:r>
-          </a:p>
-          <a:p>
-            <a:pPr marL="171450" indent="-171450" algn="just">
-              <a:buFontTx/>
-              <a:buChar char="-"/>
-            </a:pPr>
-            <a:r>
-              <a:rPr lang="en-US" sz="5400" dirty="0"/>
-              <a:t>The average of the maximum of each window of the training </a:t>
-            </a:r>
-            <a:r>
-              <a:rPr lang="en-US" sz="5400" dirty="0" smtClean="0"/>
-              <a:t>set</a:t>
-            </a:r>
-            <a:endParaRPr lang="en-US" sz="5400" dirty="0"/>
+            <a:endParaRPr lang="en-US" sz="3800" dirty="0" smtClean="0"/>
+          </a:p>
+          <a:p>
+            <a:pPr algn="just"/>
+            <a:r>
+              <a:rPr lang="en-US" sz="3800" dirty="0" smtClean="0"/>
+              <a:t>Since </a:t>
+            </a:r>
+            <a:r>
+              <a:rPr lang="en-US" sz="3800" dirty="0"/>
+              <a:t>we assume </a:t>
+            </a:r>
+            <a:r>
+              <a:rPr lang="en-US" sz="3800" dirty="0" smtClean="0"/>
+              <a:t>calibration windows </a:t>
+            </a:r>
+            <a:r>
+              <a:rPr lang="en-US" sz="3800" dirty="0"/>
+              <a:t>to be free of artifacts, we also assume their variance to be significantly smaller than windows with artifacts.</a:t>
+            </a:r>
+            <a:endParaRPr lang="en-US" sz="3800" dirty="0"/>
+          </a:p>
+          <a:p>
+            <a:pPr algn="just"/>
+            <a:endParaRPr lang="en-US" sz="3800" dirty="0"/>
           </a:p>
         </p:txBody>
       </p:sp>
@@ -4875,8 +4924,8 @@
         </p:nvSpPr>
         <p:spPr>
           <a:xfrm>
-            <a:off x="17447472" y="11630938"/>
-            <a:ext cx="12509914" cy="707886"/>
+            <a:off x="15597566" y="11310680"/>
+            <a:ext cx="19086054" cy="1846659"/>
           </a:xfrm>
           <a:prstGeom prst="rect">
             <a:avLst/>
@@ -4893,14 +4942,14 @@
           <a:p>
             <a:pPr algn="just"/>
             <a:r>
-              <a:rPr lang="en-US" sz="4000" b="1" dirty="0" smtClean="0"/>
+              <a:rPr lang="en-US" sz="3800" b="1" dirty="0" smtClean="0"/>
               <a:t>Figure 1</a:t>
             </a:r>
             <a:r>
-              <a:rPr lang="en-US" sz="4000" dirty="0" smtClean="0"/>
-              <a:t>: representation of one channel of an EEG dataset</a:t>
-            </a:r>
-            <a:endParaRPr lang="en-US" sz="4000" dirty="0"/>
+              <a:rPr lang="en-US" sz="3800" dirty="0" smtClean="0"/>
+              <a:t>: one channel of the original dataset is represented, among the 14 recorded one. It contains 1400 samples. 20% of the dataset has been allocated for the calibration, the remaining is used as testing set.</a:t>
+            </a:r>
+            <a:endParaRPr lang="en-US" sz="3800" dirty="0"/>
           </a:p>
         </p:txBody>
       </p:sp>
@@ -4912,8 +4961,8 @@
         </p:nvSpPr>
         <p:spPr>
           <a:xfrm>
-            <a:off x="17447472" y="19494737"/>
-            <a:ext cx="12210113" cy="707886"/>
+            <a:off x="15597565" y="18976047"/>
+            <a:ext cx="19086055" cy="3077766"/>
           </a:xfrm>
           <a:prstGeom prst="rect">
             <a:avLst/>
@@ -4930,48 +4979,54 @@
           <a:p>
             <a:pPr algn="just"/>
             <a:r>
-              <a:rPr lang="en-US" sz="4000" b="1" dirty="0" smtClean="0"/>
+              <a:rPr lang="en-US" sz="3800" b="1" dirty="0" smtClean="0"/>
               <a:t>Figure 2:</a:t>
             </a:r>
             <a:r>
+              <a:rPr lang="en-US" sz="3800" dirty="0" smtClean="0"/>
+              <a:t> </a:t>
+            </a:r>
+            <a:r>
+              <a:rPr lang="en-US" sz="3800" dirty="0" smtClean="0"/>
+              <a:t>artifacts are si</a:t>
+            </a:r>
+            <a:r>
+              <a:rPr lang="en-US" sz="3800" dirty="0" smtClean="0"/>
+              <a:t>mulated </a:t>
+            </a:r>
+            <a:r>
+              <a:rPr lang="en-US" sz="4000" dirty="0"/>
+              <a:t>using a sinusoidal function parametrized by an amplitude and a period, </a:t>
+            </a:r>
+            <a:r>
               <a:rPr lang="en-US" sz="4000" dirty="0" smtClean="0"/>
-              <a:t> original dataset with simulated artifacts added</a:t>
-            </a:r>
-            <a:endParaRPr lang="en-US" sz="4000" dirty="0"/>
-          </a:p>
-        </p:txBody>
-      </p:sp>
-      <p:sp>
-        <p:nvSpPr>
-          <p:cNvPr id="100" name="ZoneTexte 99"/>
-          <p:cNvSpPr txBox="1"/>
-          <p:nvPr/>
-        </p:nvSpPr>
-        <p:spPr>
-          <a:xfrm>
-            <a:off x="15145159" y="27582136"/>
-            <a:ext cx="18884920" cy="707886"/>
-          </a:xfrm>
-          <a:prstGeom prst="rect">
-            <a:avLst/>
-          </a:prstGeom>
-          <a:noFill/>
-        </p:spPr>
-        <p:txBody>
-          <a:bodyPr wrap="square" rtlCol="0">
-            <a:spAutoFit/>
-          </a:bodyPr>
-          <a:lstStyle/>
-          <a:p>
-            <a:r>
-              <a:rPr lang="en-US" sz="4000" b="1" dirty="0" smtClean="0"/>
-              <a:t>Figure 3:</a:t>
-            </a:r>
-            <a:r>
-              <a:rPr lang="en-US" sz="4000" dirty="0" smtClean="0"/>
-              <a:t> original dataset together with the dataset reconstructed from artifact dataset</a:t>
-            </a:r>
-            <a:endParaRPr lang="en-US" sz="4000" dirty="0"/>
+              <a:t>and </a:t>
+            </a:r>
+            <a:r>
+              <a:rPr lang="en-US" sz="3800" dirty="0" smtClean="0"/>
+              <a:t>randomly </a:t>
+            </a:r>
+            <a:r>
+              <a:rPr lang="en-US" sz="3800" dirty="0" smtClean="0"/>
+              <a:t>added to the testing </a:t>
+            </a:r>
+            <a:r>
+              <a:rPr lang="en-US" sz="3800" dirty="0" smtClean="0"/>
+              <a:t>set. </a:t>
+            </a:r>
+            <a:r>
+              <a:rPr lang="en-US" sz="3800" dirty="0" smtClean="0"/>
+              <a:t>Each channel is affected differently, the amplitude of the artifact being smaller when the channel’s sensor is far from the source of the artifact. This one is the most affected </a:t>
+            </a:r>
+            <a:r>
+              <a:rPr lang="en-US" sz="3800" dirty="0" smtClean="0"/>
+              <a:t>channel (same o, </a:t>
+            </a:r>
+            <a:r>
+              <a:rPr lang="en-US" sz="3800" dirty="0" smtClean="0"/>
+              <a:t>with artifact over 20 samples, and an amplitude 8 time bigger than the original.</a:t>
+            </a:r>
+            <a:endParaRPr lang="en-US" sz="3800" dirty="0"/>
           </a:p>
         </p:txBody>
       </p:sp>
@@ -4983,8 +5038,8 @@
         </p:nvSpPr>
         <p:spPr>
           <a:xfrm>
-            <a:off x="36260384" y="14734545"/>
-            <a:ext cx="14140100" cy="1323439"/>
+            <a:off x="36108321" y="13825736"/>
+            <a:ext cx="14140100" cy="1261884"/>
           </a:xfrm>
           <a:prstGeom prst="rect">
             <a:avLst/>
@@ -5001,14 +5056,14 @@
           <a:p>
             <a:pPr algn="just"/>
             <a:r>
-              <a:rPr lang="en-US" sz="4000" b="1" dirty="0" smtClean="0"/>
+              <a:rPr lang="en-US" sz="3800" b="1" dirty="0" smtClean="0"/>
               <a:t>Figure 4:</a:t>
             </a:r>
             <a:r>
-              <a:rPr lang="en-US" sz="4000" dirty="0" smtClean="0"/>
-              <a:t> cross-validation between thresholds and window size on a 1400 sample dataset</a:t>
-            </a:r>
-            <a:endParaRPr lang="en-US" sz="4000" dirty="0"/>
+              <a:rPr lang="en-US" sz="3800" dirty="0" smtClean="0"/>
+              <a:t> cross-validation between thresholds and window size on a 1400 sample dataset. A window size of 40 is optimal.</a:t>
+            </a:r>
+            <a:endParaRPr lang="en-US" sz="3800" dirty="0"/>
           </a:p>
         </p:txBody>
       </p:sp>
@@ -5021,14 +5076,14 @@
           <p:nvPr>
             <p:extLst>
               <p:ext uri="{D42A27DB-BD31-4B8C-83A1-F6EECF244321}">
-                <p14:modId xmlns:p14="http://schemas.microsoft.com/office/powerpoint/2010/main" val="1807255320"/>
+                <p14:modId xmlns:p14="http://schemas.microsoft.com/office/powerpoint/2010/main" val="3258492"/>
               </p:ext>
             </p:extLst>
           </p:nvPr>
         </p:nvGraphicFramePr>
         <p:xfrm>
-          <a:off x="34880073" y="16346016"/>
-          <a:ext cx="15435124" cy="2743200"/>
+          <a:off x="36399553" y="16927318"/>
+          <a:ext cx="12685568" cy="2286000"/>
         </p:xfrm>
         <a:graphic>
           <a:graphicData uri="http://schemas.openxmlformats.org/drawingml/2006/table">
@@ -5037,22 +5092,22 @@
                 <a:tableStyleId>{21E4AEA4-8DFA-4A89-87EB-49C32662AFE0}</a:tableStyleId>
               </a:tblPr>
               <a:tblGrid>
-                <a:gridCol w="3858781"/>
-                <a:gridCol w="3858781"/>
-                <a:gridCol w="3858781"/>
-                <a:gridCol w="3858781"/>
+                <a:gridCol w="3171392"/>
+                <a:gridCol w="3171392"/>
+                <a:gridCol w="3171392"/>
+                <a:gridCol w="3171392"/>
               </a:tblGrid>
-              <a:tr h="223668">
+              <a:tr h="596258">
                 <a:tc>
                   <a:txBody>
                     <a:bodyPr/>
                     <a:lstStyle/>
                     <a:p>
                       <a:r>
-                        <a:rPr lang="fr-FR" sz="5400" dirty="0" err="1" smtClean="0"/>
+                        <a:rPr lang="fr-FR" sz="4400" dirty="0" err="1" smtClean="0"/>
                         <a:t>Threshold</a:t>
                       </a:r>
-                      <a:endParaRPr lang="fr-FR" sz="5400" dirty="0"/>
+                      <a:endParaRPr lang="fr-FR" sz="4400" dirty="0"/>
                     </a:p>
                   </a:txBody>
                   <a:tcPr>
@@ -5067,10 +5122,10 @@
                     <a:lstStyle/>
                     <a:p>
                       <a:r>
-                        <a:rPr lang="fr-FR" sz="5400" dirty="0" smtClean="0"/>
+                        <a:rPr lang="fr-FR" sz="4400" dirty="0" smtClean="0"/>
                         <a:t>Max</a:t>
                       </a:r>
-                      <a:endParaRPr lang="fr-FR" sz="5400" dirty="0"/>
+                      <a:endParaRPr lang="fr-FR" sz="4400" dirty="0"/>
                     </a:p>
                   </a:txBody>
                   <a:tcPr>
@@ -5085,10 +5140,10 @@
                     <a:lstStyle/>
                     <a:p>
                       <a:r>
-                        <a:rPr lang="fr-FR" sz="5400" dirty="0" smtClean="0"/>
+                        <a:rPr lang="fr-FR" sz="4400" dirty="0" smtClean="0"/>
                         <a:t>AVG</a:t>
                       </a:r>
-                      <a:endParaRPr lang="fr-FR" sz="5400" dirty="0"/>
+                      <a:endParaRPr lang="fr-FR" sz="4400" dirty="0"/>
                     </a:p>
                   </a:txBody>
                   <a:tcPr>
@@ -5103,10 +5158,10 @@
                     <a:lstStyle/>
                     <a:p>
                       <a:r>
-                        <a:rPr lang="fr-FR" sz="5400" dirty="0" smtClean="0"/>
+                        <a:rPr lang="fr-FR" sz="4400" dirty="0" smtClean="0"/>
                         <a:t>MAX_AVG</a:t>
                       </a:r>
-                      <a:endParaRPr lang="fr-FR" sz="5400" dirty="0"/>
+                      <a:endParaRPr lang="fr-FR" sz="4400" dirty="0"/>
                     </a:p>
                   </a:txBody>
                   <a:tcPr>
@@ -5116,17 +5171,17 @@
                   </a:tcPr>
                 </a:tc>
               </a:tr>
-              <a:tr h="223668">
+              <a:tr h="596258">
                 <a:tc>
                   <a:txBody>
                     <a:bodyPr/>
                     <a:lstStyle/>
                     <a:p>
                       <a:r>
-                        <a:rPr lang="fr-FR" sz="5400" dirty="0" err="1" smtClean="0"/>
+                        <a:rPr lang="fr-FR" sz="4400" dirty="0" err="1" smtClean="0"/>
                         <a:t>Sensitivity</a:t>
                       </a:r>
-                      <a:endParaRPr lang="fr-FR" sz="5400" dirty="0"/>
+                      <a:endParaRPr lang="fr-FR" sz="4400" dirty="0"/>
                     </a:p>
                   </a:txBody>
                   <a:tcPr>
@@ -5141,10 +5196,10 @@
                     <a:lstStyle/>
                     <a:p>
                       <a:r>
-                        <a:rPr lang="fr-FR" sz="5400" dirty="0" smtClean="0"/>
+                        <a:rPr lang="fr-FR" sz="4400" dirty="0" smtClean="0"/>
                         <a:t>0.92</a:t>
                       </a:r>
-                      <a:endParaRPr lang="fr-FR" sz="5400" dirty="0"/>
+                      <a:endParaRPr lang="fr-FR" sz="4400" dirty="0"/>
                     </a:p>
                   </a:txBody>
                   <a:tcPr/>
@@ -5155,10 +5210,10 @@
                     <a:lstStyle/>
                     <a:p>
                       <a:r>
-                        <a:rPr lang="fr-FR" sz="5400" dirty="0" smtClean="0"/>
+                        <a:rPr lang="fr-FR" sz="4400" dirty="0" smtClean="0"/>
                         <a:t>1.0</a:t>
                       </a:r>
-                      <a:endParaRPr lang="fr-FR" sz="5400" dirty="0"/>
+                      <a:endParaRPr lang="fr-FR" sz="4400" dirty="0"/>
                     </a:p>
                   </a:txBody>
                   <a:tcPr/>
@@ -5169,26 +5224,26 @@
                     <a:lstStyle/>
                     <a:p>
                       <a:r>
-                        <a:rPr lang="fr-FR" sz="5400" dirty="0" smtClean="0"/>
+                        <a:rPr lang="fr-FR" sz="4400" dirty="0" smtClean="0"/>
                         <a:t>1.0</a:t>
                       </a:r>
-                      <a:endParaRPr lang="fr-FR" sz="5400" dirty="0"/>
+                      <a:endParaRPr lang="fr-FR" sz="4400" dirty="0"/>
                     </a:p>
                   </a:txBody>
                   <a:tcPr/>
                 </a:tc>
               </a:tr>
-              <a:tr h="223668">
+              <a:tr h="596258">
                 <a:tc>
                   <a:txBody>
                     <a:bodyPr/>
                     <a:lstStyle/>
                     <a:p>
                       <a:r>
-                        <a:rPr lang="fr-FR" sz="5400" dirty="0" err="1" smtClean="0"/>
+                        <a:rPr lang="fr-FR" sz="4400" dirty="0" err="1" smtClean="0"/>
                         <a:t>Specificity</a:t>
                       </a:r>
-                      <a:endParaRPr lang="fr-FR" sz="5400" dirty="0"/>
+                      <a:endParaRPr lang="fr-FR" sz="4400" dirty="0"/>
                     </a:p>
                   </a:txBody>
                   <a:tcPr>
@@ -5203,10 +5258,10 @@
                     <a:lstStyle/>
                     <a:p>
                       <a:r>
-                        <a:rPr lang="fr-FR" sz="5400" dirty="0" smtClean="0"/>
+                        <a:rPr lang="fr-FR" sz="4400" dirty="0" smtClean="0"/>
                         <a:t>0.22</a:t>
                       </a:r>
-                      <a:endParaRPr lang="fr-FR" sz="5400" dirty="0"/>
+                      <a:endParaRPr lang="fr-FR" sz="4400" dirty="0"/>
                     </a:p>
                   </a:txBody>
                   <a:tcPr/>
@@ -5217,10 +5272,10 @@
                     <a:lstStyle/>
                     <a:p>
                       <a:r>
-                        <a:rPr lang="fr-FR" sz="5400" dirty="0" smtClean="0"/>
+                        <a:rPr lang="fr-FR" sz="4400" dirty="0" smtClean="0"/>
                         <a:t>0.0</a:t>
                       </a:r>
-                      <a:endParaRPr lang="fr-FR" sz="5400" dirty="0"/>
+                      <a:endParaRPr lang="fr-FR" sz="4400" dirty="0"/>
                     </a:p>
                   </a:txBody>
                   <a:tcPr/>
@@ -5231,10 +5286,10 @@
                     <a:lstStyle/>
                     <a:p>
                       <a:r>
-                        <a:rPr lang="fr-FR" sz="5400" dirty="0" smtClean="0"/>
+                        <a:rPr lang="fr-FR" sz="4400" dirty="0" smtClean="0"/>
                         <a:t>0.16</a:t>
                       </a:r>
-                      <a:endParaRPr lang="fr-FR" sz="5400" dirty="0"/>
+                      <a:endParaRPr lang="fr-FR" sz="4400" dirty="0"/>
                     </a:p>
                   </a:txBody>
                   <a:tcPr/>
@@ -5252,8 +5307,8 @@
         </p:nvSpPr>
         <p:spPr>
           <a:xfrm>
-            <a:off x="34880072" y="20124687"/>
-            <a:ext cx="15157751" cy="5078313"/>
+            <a:off x="35531496" y="20382271"/>
+            <a:ext cx="15157751" cy="3016210"/>
           </a:xfrm>
           <a:prstGeom prst="rect">
             <a:avLst/>
@@ -5267,74 +5322,59 @@
           <a:p>
             <a:pPr algn="just"/>
             <a:r>
-              <a:rPr lang="en-US" sz="5400" dirty="0" smtClean="0"/>
-              <a:t>For the max threshold and a window size of 40 samples with randomly</a:t>
-            </a:r>
-            <a:r>
-              <a:rPr lang="fr-FR" sz="5400" dirty="0" smtClean="0"/>
+              <a:rPr lang="en-US" sz="3800" dirty="0" smtClean="0"/>
+              <a:t>For the average threshold and a window size of 40 samples with randomly</a:t>
+            </a:r>
+            <a:r>
+              <a:rPr lang="fr-FR" sz="3800" dirty="0" smtClean="0"/>
               <a:t> </a:t>
             </a:r>
             <a:r>
-              <a:rPr lang="en-US" sz="5400" dirty="0" smtClean="0"/>
+              <a:rPr lang="en-US" sz="3800" dirty="0" smtClean="0"/>
               <a:t>added</a:t>
             </a:r>
             <a:r>
-              <a:rPr lang="fr-FR" sz="5400" dirty="0" smtClean="0"/>
+              <a:rPr lang="fr-FR" sz="3800" dirty="0" smtClean="0"/>
               <a:t> </a:t>
             </a:r>
             <a:r>
-              <a:rPr lang="en-US" sz="5400" dirty="0" smtClean="0"/>
+              <a:rPr lang="en-US" sz="3800" dirty="0" smtClean="0"/>
               <a:t>artifacts we have an average loss in the reconstructed dataset of </a:t>
             </a:r>
             <a:r>
-              <a:rPr lang="fr-FR" sz="5400" dirty="0" smtClean="0"/>
-              <a:t>0.52%. </a:t>
-            </a:r>
-            <a:r>
-              <a:rPr lang="fr-FR" sz="5400" dirty="0" smtClean="0"/>
-              <a:t>If no </a:t>
-            </a:r>
-            <a:r>
-              <a:rPr lang="en-US" sz="5400" dirty="0" smtClean="0"/>
+              <a:rPr lang="fr-FR" sz="3800" dirty="0" smtClean="0"/>
+              <a:t>0.52%. If no </a:t>
+            </a:r>
+            <a:r>
+              <a:rPr lang="en-US" sz="3800" dirty="0" smtClean="0"/>
               <a:t>artifacts</a:t>
             </a:r>
             <a:r>
-              <a:rPr lang="fr-FR" sz="5400" dirty="0" smtClean="0"/>
+              <a:rPr lang="fr-FR" sz="3800" dirty="0" smtClean="0"/>
               <a:t> are </a:t>
             </a:r>
             <a:r>
-              <a:rPr lang="en-US" sz="5400" dirty="0" smtClean="0"/>
-              <a:t>added this becomes a </a:t>
-            </a:r>
-            <a:r>
-              <a:rPr lang="en-US" sz="5400" dirty="0" smtClean="0"/>
-              <a:t>0.027% </a:t>
-            </a:r>
-            <a:r>
-              <a:rPr lang="en-US" sz="5400" dirty="0" smtClean="0"/>
-              <a:t>loss</a:t>
-            </a:r>
-            <a:r>
-              <a:rPr lang="fr-FR" sz="5400" dirty="0" smtClean="0"/>
+              <a:rPr lang="en-US" sz="3800" dirty="0" smtClean="0"/>
+              <a:t>added this becomes a 0.027% loss</a:t>
+            </a:r>
+            <a:r>
+              <a:rPr lang="fr-FR" sz="3800" dirty="0" smtClean="0"/>
               <a:t>. </a:t>
             </a:r>
-          </a:p>
-          <a:p>
-            <a:pPr algn="just"/>
-            <a:r>
-              <a:rPr lang="en-US" sz="5400" dirty="0" smtClean="0"/>
+            <a:r>
+              <a:rPr lang="en-US" sz="3800" dirty="0" smtClean="0"/>
               <a:t>For the same window size we can </a:t>
             </a:r>
             <a:r>
-              <a:rPr lang="en-US" sz="5400" dirty="0"/>
+              <a:rPr lang="en-US" sz="3800" dirty="0"/>
               <a:t>remove artifacts at a rate of </a:t>
             </a:r>
             <a:r>
-              <a:rPr lang="en-US" sz="5400" dirty="0" smtClean="0"/>
+              <a:rPr lang="en-US" sz="3800" dirty="0" smtClean="0"/>
               <a:t>81Hz allowing real </a:t>
             </a:r>
             <a:r>
-              <a:rPr lang="en-US" sz="5400" dirty="0"/>
+              <a:rPr lang="en-US" sz="3800" dirty="0"/>
               <a:t>time artifact removal.</a:t>
             </a:r>
           </a:p>
@@ -5348,8 +5388,8 @@
         </p:nvSpPr>
         <p:spPr>
           <a:xfrm>
-            <a:off x="36260384" y="19298344"/>
-            <a:ext cx="13881980" cy="707886"/>
+            <a:off x="36397521" y="19510356"/>
+            <a:ext cx="13881980" cy="677108"/>
           </a:xfrm>
           <a:prstGeom prst="rect">
             <a:avLst/>
@@ -5366,22 +5406,22 @@
           <a:p>
             <a:pPr algn="just"/>
             <a:r>
-              <a:rPr lang="en-US" sz="4000" b="1" dirty="0" smtClean="0"/>
+              <a:rPr lang="en-US" sz="3800" b="1" dirty="0" smtClean="0"/>
               <a:t>Figure </a:t>
             </a:r>
             <a:r>
-              <a:rPr lang="en-US" sz="4000" b="1" dirty="0"/>
+              <a:rPr lang="en-US" sz="3800" b="1" dirty="0"/>
               <a:t>5</a:t>
             </a:r>
             <a:r>
-              <a:rPr lang="en-US" sz="4000" b="1" dirty="0" smtClean="0"/>
+              <a:rPr lang="en-US" sz="3800" b="1" dirty="0" smtClean="0"/>
               <a:t>:</a:t>
             </a:r>
             <a:r>
-              <a:rPr lang="en-US" sz="4000" dirty="0" smtClean="0"/>
+              <a:rPr lang="en-US" sz="3800" dirty="0" smtClean="0"/>
               <a:t> Sensitivity and specificity for the different threshold</a:t>
             </a:r>
-            <a:endParaRPr lang="en-US" sz="4000" dirty="0"/>
+            <a:endParaRPr lang="en-US" sz="3800" dirty="0"/>
           </a:p>
         </p:txBody>
       </p:sp>
@@ -5393,7 +5433,7 @@
         </p:nvCxnSpPr>
         <p:spPr>
           <a:xfrm>
-            <a:off x="34172152" y="3783224"/>
+            <a:off x="34964240" y="3063144"/>
             <a:ext cx="0" cy="23436000"/>
           </a:xfrm>
           <a:prstGeom prst="line">
@@ -5429,7 +5469,7 @@
           <p:nvPr/>
         </p:nvPicPr>
         <p:blipFill>
-          <a:blip r:embed="rId7">
+          <a:blip r:embed="rId6">
             <a:extLst>
               <a:ext uri="{28A0092B-C50C-407E-A947-70E740481C1C}">
                 <a14:useLocalDpi xmlns:a14="http://schemas.microsoft.com/office/drawing/2010/main" val="0"/>
@@ -5442,8 +5482,8 @@
         </p:blipFill>
         <p:spPr>
           <a:xfrm>
-            <a:off x="34748216" y="3240560"/>
-            <a:ext cx="15652268" cy="11451707"/>
+            <a:off x="37659630" y="6120880"/>
+            <a:ext cx="10458865" cy="7652045"/>
           </a:xfrm>
           <a:prstGeom prst="rect">
             <a:avLst/>
@@ -5452,40 +5492,14 @@
       </p:pic>
       <p:sp>
         <p:nvSpPr>
-          <p:cNvPr id="119" name="Rectangle 118"/>
-          <p:cNvSpPr/>
-          <p:nvPr/>
-        </p:nvSpPr>
-        <p:spPr>
-          <a:xfrm>
-            <a:off x="34911396" y="27032323"/>
-            <a:ext cx="15126428" cy="923330"/>
-          </a:xfrm>
-          <a:prstGeom prst="rect">
-            <a:avLst/>
-          </a:prstGeom>
-        </p:spPr>
-        <p:txBody>
-          <a:bodyPr wrap="square">
-            <a:spAutoFit/>
-          </a:bodyPr>
-          <a:lstStyle/>
-          <a:p>
-            <a:pPr algn="just"/>
-            <a:endParaRPr lang="fr-FR" sz="5400" dirty="0" smtClean="0"/>
-          </a:p>
-        </p:txBody>
-      </p:sp>
-      <p:sp>
-        <p:nvSpPr>
           <p:cNvPr id="3" name="ZoneTexte 2"/>
           <p:cNvSpPr txBox="1"/>
           <p:nvPr/>
         </p:nvSpPr>
         <p:spPr>
           <a:xfrm>
-            <a:off x="34880072" y="26643160"/>
-            <a:ext cx="15435125" cy="1754326"/>
+            <a:off x="35531496" y="24986976"/>
+            <a:ext cx="15435125" cy="1261884"/>
           </a:xfrm>
           <a:prstGeom prst="rect">
             <a:avLst/>
@@ -5499,22 +5513,633 @@
           <a:lstStyle/>
           <a:p>
             <a:r>
-              <a:rPr lang="en-US" sz="5400" dirty="0" smtClean="0"/>
-              <a:t>We can remove artifacts with an average loss </a:t>
-            </a:r>
-            <a:r>
-              <a:rPr lang="en-US" sz="5400" smtClean="0"/>
-              <a:t>of </a:t>
-            </a:r>
-            <a:r>
-              <a:rPr lang="en-US" sz="5400" smtClean="0"/>
-              <a:t>0.52% </a:t>
-            </a:r>
-            <a:r>
-              <a:rPr lang="en-US" sz="5400" dirty="0" smtClean="0"/>
-              <a:t>at a rate estimated to support real time analysis.</a:t>
-            </a:r>
-            <a:endParaRPr lang="en-US" sz="5400" dirty="0"/>
+              <a:rPr lang="en-US" sz="3800" dirty="0" smtClean="0"/>
+              <a:t>We can remove artifacts with an average loss of 0.52% at a rate estimated to support real time analysis.</a:t>
+            </a:r>
+            <a:endParaRPr lang="en-US" sz="3800" dirty="0"/>
+          </a:p>
+        </p:txBody>
+      </p:sp>
+      <p:sp>
+        <p:nvSpPr>
+          <p:cNvPr id="5" name="ZoneTexte 4"/>
+          <p:cNvSpPr txBox="1"/>
+          <p:nvPr/>
+        </p:nvSpPr>
+        <p:spPr>
+          <a:xfrm>
+            <a:off x="35434408" y="26353393"/>
+            <a:ext cx="15368554" cy="4401205"/>
+          </a:xfrm>
+          <a:prstGeom prst="rect">
+            <a:avLst/>
+          </a:prstGeom>
+          <a:noFill/>
+        </p:spPr>
+        <p:txBody>
+          <a:bodyPr wrap="square" rtlCol="0">
+            <a:spAutoFit/>
+          </a:bodyPr>
+          <a:lstStyle/>
+          <a:p>
+            <a:pPr algn="just"/>
+            <a:r>
+              <a:rPr lang="en-US" sz="3000" dirty="0" smtClean="0"/>
+              <a:t>[1] Mullen, T.R., et al 2015. Real-time neuroimaging and cognitive monitoring using wearable dry EEG. </a:t>
+            </a:r>
+            <a:r>
+              <a:rPr lang="en-US" sz="3000" i="1" dirty="0" smtClean="0"/>
+              <a:t>Biomedical Engineering, IEEE Transactions on</a:t>
+            </a:r>
+            <a:r>
+              <a:rPr lang="en-US" sz="3000" dirty="0" smtClean="0"/>
+              <a:t>, </a:t>
+            </a:r>
+            <a:r>
+              <a:rPr lang="en-US" sz="3000" i="1" dirty="0" smtClean="0"/>
+              <a:t>62</a:t>
+            </a:r>
+            <a:r>
+              <a:rPr lang="en-US" sz="3000" dirty="0" smtClean="0"/>
+              <a:t>(11), pp.2553-2567</a:t>
+            </a:r>
+          </a:p>
+          <a:p>
+            <a:pPr algn="just"/>
+            <a:r>
+              <a:rPr lang="en-US" sz="3000" dirty="0"/>
+              <a:t>[2] </a:t>
+            </a:r>
+            <a:r>
+              <a:rPr lang="en-US" sz="3000" dirty="0">
+                <a:hlinkClick r:id="rId7"/>
+              </a:rPr>
+              <a:t>https://</a:t>
+            </a:r>
+            <a:r>
+              <a:rPr lang="en-US" sz="3000" dirty="0" smtClean="0">
+                <a:hlinkClick r:id="rId7"/>
+              </a:rPr>
+              <a:t>github.com/codehunks/emotiv/tree/master/csv-eeg-data</a:t>
+            </a:r>
+            <a:endParaRPr lang="en-US" sz="3000" dirty="0" smtClean="0"/>
+          </a:p>
+          <a:p>
+            <a:r>
+              <a:rPr lang="fr-FR" sz="3200" dirty="0"/>
+              <a:t>[2] Delorme, A., </a:t>
+            </a:r>
+            <a:r>
+              <a:rPr lang="fr-FR" sz="3200" dirty="0" err="1"/>
+              <a:t>Kothe</a:t>
+            </a:r>
+            <a:r>
+              <a:rPr lang="fr-FR" sz="3200" dirty="0"/>
+              <a:t>, C., </a:t>
+            </a:r>
+            <a:r>
+              <a:rPr lang="fr-FR" sz="3200" dirty="0" err="1"/>
+              <a:t>Vankov</a:t>
+            </a:r>
+            <a:r>
+              <a:rPr lang="fr-FR" sz="3200" dirty="0"/>
+              <a:t>, A., </a:t>
+            </a:r>
+            <a:r>
+              <a:rPr lang="fr-FR" sz="3200" dirty="0" err="1"/>
+              <a:t>Bigdely-Shamlo</a:t>
+            </a:r>
+            <a:r>
+              <a:rPr lang="fr-FR" sz="3200" dirty="0"/>
+              <a:t>, N., </a:t>
+            </a:r>
+            <a:r>
+              <a:rPr lang="fr-FR" sz="3200" dirty="0" err="1"/>
+              <a:t>Oostenveld</a:t>
+            </a:r>
+            <a:r>
+              <a:rPr lang="fr-FR" sz="3200" dirty="0"/>
+              <a:t>, R., </a:t>
+            </a:r>
+            <a:r>
+              <a:rPr lang="fr-FR" sz="3200" dirty="0" err="1"/>
+              <a:t>Zander</a:t>
+            </a:r>
+            <a:r>
+              <a:rPr lang="fr-FR" sz="3200" dirty="0"/>
+              <a:t>, T.O. and </a:t>
+            </a:r>
+            <a:r>
+              <a:rPr lang="fr-FR" sz="3200" dirty="0" err="1"/>
+              <a:t>Makeig</a:t>
+            </a:r>
+            <a:r>
+              <a:rPr lang="fr-FR" sz="3200" dirty="0"/>
+              <a:t>, S., 2010. MATLAB-</a:t>
+            </a:r>
+            <a:r>
+              <a:rPr lang="fr-FR" sz="3200" dirty="0" err="1"/>
+              <a:t>based</a:t>
+            </a:r>
+            <a:r>
+              <a:rPr lang="fr-FR" sz="3200" dirty="0"/>
+              <a:t> </a:t>
+            </a:r>
+            <a:r>
+              <a:rPr lang="fr-FR" sz="3200" dirty="0" err="1"/>
+              <a:t>tools</a:t>
+            </a:r>
+            <a:r>
+              <a:rPr lang="fr-FR" sz="3200" dirty="0"/>
+              <a:t> for BCI </a:t>
+            </a:r>
+            <a:r>
+              <a:rPr lang="fr-FR" sz="3200" dirty="0" err="1"/>
+              <a:t>research</a:t>
+            </a:r>
+            <a:r>
+              <a:rPr lang="fr-FR" sz="3200" dirty="0"/>
+              <a:t>. In </a:t>
+            </a:r>
+            <a:r>
+              <a:rPr lang="fr-FR" sz="3200" i="1" dirty="0"/>
+              <a:t>Brain-Computer Interfaces</a:t>
+            </a:r>
+            <a:r>
+              <a:rPr lang="fr-FR" sz="3200" dirty="0"/>
+              <a:t> (pp. 241-259). Springer London</a:t>
+            </a:r>
+            <a:r>
+              <a:rPr lang="fr-FR" sz="3200" dirty="0" smtClean="0"/>
+              <a:t>.</a:t>
+            </a:r>
+            <a:endParaRPr lang="fr-FR" sz="3200" dirty="0"/>
+          </a:p>
+          <a:p>
+            <a:r>
+              <a:rPr lang="fr-FR" sz="3200" dirty="0"/>
+              <a:t>[3] Hsu, S.H., Mullen, T., Jung, T.P. and </a:t>
+            </a:r>
+            <a:r>
+              <a:rPr lang="fr-FR" sz="3200" dirty="0" err="1"/>
+              <a:t>Cauwenberghs</a:t>
+            </a:r>
+            <a:r>
+              <a:rPr lang="fr-FR" sz="3200" dirty="0"/>
+              <a:t>, G., 2015. Real-time Adaptive EEG Source </a:t>
+            </a:r>
+            <a:r>
+              <a:rPr lang="fr-FR" sz="3200" dirty="0" err="1"/>
+              <a:t>Separation</a:t>
+            </a:r>
+            <a:r>
+              <a:rPr lang="fr-FR" sz="3200" dirty="0"/>
+              <a:t> </a:t>
+            </a:r>
+            <a:r>
+              <a:rPr lang="fr-FR" sz="3200" dirty="0" err="1"/>
+              <a:t>using</a:t>
+            </a:r>
+            <a:r>
+              <a:rPr lang="fr-FR" sz="3200" dirty="0"/>
+              <a:t> Online </a:t>
+            </a:r>
+            <a:r>
+              <a:rPr lang="fr-FR" sz="3200" dirty="0" err="1"/>
+              <a:t>Recursive</a:t>
+            </a:r>
+            <a:r>
+              <a:rPr lang="fr-FR" sz="3200" dirty="0"/>
+              <a:t> Independent Component </a:t>
+            </a:r>
+            <a:r>
+              <a:rPr lang="fr-FR" sz="3200" dirty="0" err="1"/>
+              <a:t>Analysis</a:t>
+            </a:r>
+            <a:r>
+              <a:rPr lang="fr-FR" sz="3200" dirty="0"/>
+              <a:t>.</a:t>
+            </a:r>
+          </a:p>
+          <a:p>
+            <a:pPr algn="just"/>
+            <a:endParaRPr lang="en-US" sz="3000" dirty="0"/>
+          </a:p>
+        </p:txBody>
+      </p:sp>
+      <p:sp>
+        <p:nvSpPr>
+          <p:cNvPr id="13" name="ZoneTexte 12"/>
+          <p:cNvSpPr txBox="1"/>
+          <p:nvPr/>
+        </p:nvSpPr>
+        <p:spPr>
+          <a:xfrm>
+            <a:off x="15597565" y="3764012"/>
+            <a:ext cx="19086055" cy="1846659"/>
+          </a:xfrm>
+          <a:prstGeom prst="rect">
+            <a:avLst/>
+          </a:prstGeom>
+          <a:noFill/>
+        </p:spPr>
+        <p:txBody>
+          <a:bodyPr wrap="square" rtlCol="0">
+            <a:spAutoFit/>
+          </a:bodyPr>
+          <a:lstStyle/>
+          <a:p>
+            <a:pPr algn="just"/>
+            <a:r>
+              <a:rPr lang="en-US" sz="3800" dirty="0" smtClean="0"/>
+              <a:t>The following experiments are done on an EEG dataset recorded using an </a:t>
+            </a:r>
+            <a:r>
+              <a:rPr lang="en-US" sz="3800" i="1" dirty="0" smtClean="0"/>
+              <a:t>Emotiv</a:t>
+            </a:r>
+            <a:r>
+              <a:rPr lang="en-US" sz="3800" dirty="0" smtClean="0"/>
+              <a:t> [2] device. It records on a total of 14 channels. The initial dataset is assumed to be cleaned, e.g. free of artifacts.</a:t>
+            </a:r>
+            <a:endParaRPr lang="en-US" sz="3800" dirty="0"/>
+          </a:p>
+        </p:txBody>
+      </p:sp>
+      <p:grpSp>
+        <p:nvGrpSpPr>
+          <p:cNvPr id="7" name="Groupe 6"/>
+          <p:cNvGrpSpPr/>
+          <p:nvPr/>
+        </p:nvGrpSpPr>
+        <p:grpSpPr>
+          <a:xfrm>
+            <a:off x="15597565" y="5904856"/>
+            <a:ext cx="19222659" cy="5357912"/>
+            <a:chOff x="17250272" y="5904856"/>
+            <a:chExt cx="15410224" cy="5357912"/>
+          </a:xfrm>
+        </p:grpSpPr>
+        <p:pic>
+          <p:nvPicPr>
+            <p:cNvPr id="88" name="Image 87"/>
+            <p:cNvPicPr>
+              <a:picLocks noChangeAspect="1"/>
+            </p:cNvPicPr>
+            <p:nvPr/>
+          </p:nvPicPr>
+          <p:blipFill>
+            <a:blip r:embed="rId8">
+              <a:extLst>
+                <a:ext uri="{28A0092B-C50C-407E-A947-70E740481C1C}">
+                  <a14:useLocalDpi xmlns:a14="http://schemas.microsoft.com/office/drawing/2010/main" val="0"/>
+                </a:ext>
+              </a:extLst>
+            </a:blip>
+            <a:stretch>
+              <a:fillRect/>
+            </a:stretch>
+          </p:blipFill>
+          <p:spPr>
+            <a:xfrm>
+              <a:off x="17250272" y="5904856"/>
+              <a:ext cx="15410224" cy="5357912"/>
+            </a:xfrm>
+            <a:prstGeom prst="rect">
+              <a:avLst/>
+            </a:prstGeom>
+          </p:spPr>
+        </p:pic>
+        <p:cxnSp>
+          <p:nvCxnSpPr>
+            <p:cNvPr id="15" name="Connecteur droit avec flèche 14"/>
+            <p:cNvCxnSpPr/>
+            <p:nvPr/>
+          </p:nvCxnSpPr>
+          <p:spPr>
+            <a:xfrm flipV="1">
+              <a:off x="18803867" y="6966770"/>
+              <a:ext cx="2414770" cy="18206"/>
+            </a:xfrm>
+            <a:prstGeom prst="straightConnector1">
+              <a:avLst/>
+            </a:prstGeom>
+            <a:ln w="28575">
+              <a:solidFill>
+                <a:schemeClr val="tx1"/>
+              </a:solidFill>
+              <a:headEnd type="triangle"/>
+              <a:tailEnd type="triangle"/>
+            </a:ln>
+          </p:spPr>
+          <p:style>
+            <a:lnRef idx="1">
+              <a:schemeClr val="accent1"/>
+            </a:lnRef>
+            <a:fillRef idx="0">
+              <a:schemeClr val="accent1"/>
+            </a:fillRef>
+            <a:effectRef idx="0">
+              <a:schemeClr val="accent1"/>
+            </a:effectRef>
+            <a:fontRef idx="minor">
+              <a:schemeClr val="tx1"/>
+            </a:fontRef>
+          </p:style>
+        </p:cxnSp>
+        <p:cxnSp>
+          <p:nvCxnSpPr>
+            <p:cNvPr id="27" name="Connecteur droit avec flèche 26"/>
+            <p:cNvCxnSpPr/>
+            <p:nvPr/>
+          </p:nvCxnSpPr>
+          <p:spPr>
+            <a:xfrm>
+              <a:off x="21499256" y="6962215"/>
+              <a:ext cx="10020615" cy="23650"/>
+            </a:xfrm>
+            <a:prstGeom prst="straightConnector1">
+              <a:avLst/>
+            </a:prstGeom>
+            <a:ln w="28575">
+              <a:solidFill>
+                <a:schemeClr val="tx1"/>
+              </a:solidFill>
+              <a:headEnd type="triangle"/>
+              <a:tailEnd type="triangle"/>
+            </a:ln>
+          </p:spPr>
+          <p:style>
+            <a:lnRef idx="1">
+              <a:schemeClr val="accent1"/>
+            </a:lnRef>
+            <a:fillRef idx="0">
+              <a:schemeClr val="accent1"/>
+            </a:fillRef>
+            <a:effectRef idx="0">
+              <a:schemeClr val="accent1"/>
+            </a:effectRef>
+            <a:fontRef idx="minor">
+              <a:schemeClr val="tx1"/>
+            </a:fontRef>
+          </p:style>
+        </p:cxnSp>
+        <p:sp>
+          <p:nvSpPr>
+            <p:cNvPr id="28" name="ZoneTexte 27"/>
+            <p:cNvSpPr txBox="1"/>
+            <p:nvPr/>
+          </p:nvSpPr>
+          <p:spPr>
+            <a:xfrm>
+              <a:off x="18902003" y="6368758"/>
+              <a:ext cx="3715767" cy="630942"/>
+            </a:xfrm>
+            <a:prstGeom prst="rect">
+              <a:avLst/>
+            </a:prstGeom>
+            <a:noFill/>
+          </p:spPr>
+          <p:txBody>
+            <a:bodyPr wrap="square" rtlCol="0">
+              <a:spAutoFit/>
+            </a:bodyPr>
+            <a:lstStyle/>
+            <a:p>
+              <a:r>
+                <a:rPr lang="en-US" sz="3500" dirty="0" smtClean="0"/>
+                <a:t>Calibration</a:t>
+              </a:r>
+              <a:endParaRPr lang="en-US" sz="3500" dirty="0"/>
+            </a:p>
+          </p:txBody>
+        </p:sp>
+        <p:sp>
+          <p:nvSpPr>
+            <p:cNvPr id="66" name="ZoneTexte 65"/>
+            <p:cNvSpPr txBox="1"/>
+            <p:nvPr/>
+          </p:nvSpPr>
+          <p:spPr>
+            <a:xfrm>
+              <a:off x="24408357" y="6346689"/>
+              <a:ext cx="3715767" cy="630942"/>
+            </a:xfrm>
+            <a:prstGeom prst="rect">
+              <a:avLst/>
+            </a:prstGeom>
+            <a:noFill/>
+          </p:spPr>
+          <p:txBody>
+            <a:bodyPr wrap="square" rtlCol="0">
+              <a:spAutoFit/>
+            </a:bodyPr>
+            <a:lstStyle/>
+            <a:p>
+              <a:r>
+                <a:rPr lang="en-US" sz="3500" dirty="0" smtClean="0"/>
+                <a:t>Testing</a:t>
+              </a:r>
+              <a:endParaRPr lang="en-US" sz="3500" dirty="0"/>
+            </a:p>
+          </p:txBody>
+        </p:sp>
+      </p:grpSp>
+      <p:sp>
+        <p:nvSpPr>
+          <p:cNvPr id="67" name="ZoneTexte 66"/>
+          <p:cNvSpPr txBox="1"/>
+          <p:nvPr/>
+        </p:nvSpPr>
+        <p:spPr>
+          <a:xfrm>
+            <a:off x="15597565" y="27469508"/>
+            <a:ext cx="18896686" cy="1261884"/>
+          </a:xfrm>
+          <a:prstGeom prst="rect">
+            <a:avLst/>
+          </a:prstGeom>
+          <a:solidFill>
+            <a:schemeClr val="bg1"/>
+          </a:solidFill>
+        </p:spPr>
+        <p:txBody>
+          <a:bodyPr wrap="square" rtlCol="0">
+            <a:spAutoFit/>
+          </a:bodyPr>
+          <a:lstStyle/>
+          <a:p>
+            <a:pPr algn="just"/>
+            <a:r>
+              <a:rPr lang="en-US" sz="3800" b="1" dirty="0" smtClean="0"/>
+              <a:t>Figure 3:</a:t>
+            </a:r>
+            <a:r>
+              <a:rPr lang="en-US" sz="3800" dirty="0" smtClean="0"/>
+              <a:t> for the same channel than figure 2, the original signal and the reconstructed one are presented. The average threshold has been used for PCA.</a:t>
+            </a:r>
+            <a:endParaRPr lang="en-US" sz="3800" dirty="0"/>
+          </a:p>
+        </p:txBody>
+      </p:sp>
+      <p:sp>
+        <p:nvSpPr>
+          <p:cNvPr id="68" name="ZoneTexte 67"/>
+          <p:cNvSpPr txBox="1"/>
+          <p:nvPr/>
+        </p:nvSpPr>
+        <p:spPr>
+          <a:xfrm>
+            <a:off x="35244860" y="2784951"/>
+            <a:ext cx="15444388" cy="2431435"/>
+          </a:xfrm>
+          <a:prstGeom prst="rect">
+            <a:avLst/>
+          </a:prstGeom>
+          <a:noFill/>
+        </p:spPr>
+        <p:txBody>
+          <a:bodyPr wrap="square" rtlCol="0">
+            <a:spAutoFit/>
+          </a:bodyPr>
+          <a:lstStyle/>
+          <a:p>
+            <a:pPr algn="just"/>
+            <a:r>
+              <a:rPr lang="en-US" sz="3800" dirty="0" smtClean="0"/>
+              <a:t>Several parameters can be adjusted, starting by the size of the windows. Cross validation for each threshold indicates the window size with the best results. Standard error measure has been preferred to mean squared error WHY </a:t>
+            </a:r>
+            <a:r>
+              <a:rPr lang="en-US" sz="3800" dirty="0" err="1" smtClean="0"/>
+              <a:t>WHY</a:t>
+            </a:r>
+            <a:r>
+              <a:rPr lang="en-US" sz="3800" dirty="0" smtClean="0"/>
+              <a:t> </a:t>
+            </a:r>
+            <a:r>
+              <a:rPr lang="en-US" sz="3800" dirty="0" err="1" smtClean="0"/>
+              <a:t>WHY</a:t>
+            </a:r>
+            <a:r>
+              <a:rPr lang="en-US" sz="3800" dirty="0" smtClean="0"/>
+              <a:t> </a:t>
+            </a:r>
+            <a:r>
+              <a:rPr lang="en-US" sz="3800" dirty="0" err="1" smtClean="0"/>
+              <a:t>WHY</a:t>
+            </a:r>
+            <a:r>
+              <a:rPr lang="en-US" sz="3800" dirty="0" smtClean="0"/>
+              <a:t> </a:t>
+            </a:r>
+            <a:r>
+              <a:rPr lang="en-US" sz="3800" dirty="0" err="1" smtClean="0"/>
+              <a:t>WHY</a:t>
+            </a:r>
+            <a:r>
+              <a:rPr lang="en-US" sz="3800" dirty="0" smtClean="0"/>
+              <a:t> </a:t>
+            </a:r>
+            <a:r>
+              <a:rPr lang="en-US" sz="3800" dirty="0" err="1" smtClean="0"/>
+              <a:t>WHY</a:t>
+            </a:r>
+            <a:r>
+              <a:rPr lang="en-US" sz="3800" dirty="0" smtClean="0"/>
+              <a:t> </a:t>
+            </a:r>
+            <a:r>
+              <a:rPr lang="en-US" sz="3800" dirty="0" err="1" smtClean="0"/>
+              <a:t>WHY</a:t>
+            </a:r>
+            <a:r>
+              <a:rPr lang="en-US" sz="3800" dirty="0" smtClean="0"/>
+              <a:t> </a:t>
+            </a:r>
+            <a:r>
+              <a:rPr lang="en-US" sz="3800" dirty="0" err="1" smtClean="0"/>
+              <a:t>WHY</a:t>
+            </a:r>
+            <a:r>
+              <a:rPr lang="en-US" sz="3800" dirty="0" smtClean="0"/>
+              <a:t> </a:t>
+            </a:r>
+            <a:r>
+              <a:rPr lang="en-US" sz="3800" dirty="0" err="1" smtClean="0"/>
+              <a:t>WHY</a:t>
+            </a:r>
+            <a:r>
+              <a:rPr lang="en-US" sz="3800" dirty="0" smtClean="0"/>
+              <a:t> </a:t>
+            </a:r>
+            <a:r>
+              <a:rPr lang="en-US" sz="3800" dirty="0" err="1" smtClean="0"/>
+              <a:t>WHY</a:t>
+            </a:r>
+            <a:r>
+              <a:rPr lang="en-US" sz="3800" dirty="0" smtClean="0"/>
+              <a:t> </a:t>
+            </a:r>
+            <a:r>
+              <a:rPr lang="en-US" sz="3800" dirty="0" err="1" smtClean="0"/>
+              <a:t>WHY</a:t>
+            </a:r>
+            <a:r>
+              <a:rPr lang="en-US" sz="3800" dirty="0" smtClean="0"/>
+              <a:t> </a:t>
+            </a:r>
+            <a:r>
+              <a:rPr lang="en-US" sz="3800" dirty="0" err="1" smtClean="0"/>
+              <a:t>WHY</a:t>
+            </a:r>
+            <a:r>
+              <a:rPr lang="en-US" sz="3800" dirty="0" smtClean="0"/>
+              <a:t> </a:t>
+            </a:r>
+            <a:r>
+              <a:rPr lang="en-US" sz="3800" dirty="0" err="1" smtClean="0"/>
+              <a:t>WHY</a:t>
+            </a:r>
+            <a:r>
+              <a:rPr lang="en-US" sz="3800" dirty="0" smtClean="0"/>
+              <a:t>.</a:t>
+            </a:r>
+            <a:endParaRPr lang="en-US" sz="3800" dirty="0"/>
+          </a:p>
+        </p:txBody>
+      </p:sp>
+      <p:sp>
+        <p:nvSpPr>
+          <p:cNvPr id="69" name="Rectangle 68"/>
+          <p:cNvSpPr/>
+          <p:nvPr/>
+        </p:nvSpPr>
+        <p:spPr>
+          <a:xfrm>
+            <a:off x="35434408" y="15121880"/>
+            <a:ext cx="15157751" cy="1846659"/>
+          </a:xfrm>
+          <a:prstGeom prst="rect">
+            <a:avLst/>
+          </a:prstGeom>
+        </p:spPr>
+        <p:txBody>
+          <a:bodyPr wrap="square">
+            <a:spAutoFit/>
+          </a:bodyPr>
+          <a:lstStyle/>
+          <a:p>
+            <a:pPr algn="just"/>
+            <a:r>
+              <a:rPr lang="en-US" sz="3800" dirty="0" smtClean="0"/>
+              <a:t>For a window with no artifacts, no component should be removed, so that reconstructed and original window are </a:t>
+            </a:r>
+            <a:r>
+              <a:rPr lang="en-US" sz="3800" dirty="0" smtClean="0"/>
+              <a:t>identical, and we want artifacts to be systematically removed.</a:t>
+            </a:r>
+            <a:endParaRPr lang="en-US" sz="3800" dirty="0"/>
           </a:p>
         </p:txBody>
       </p:sp>

</xml_diff>

<commit_message>
some changes to see what happens
</commit_message>
<xml_diff>
--- a/project/Poster_2.pptx
+++ b/project/Poster_2.pptx
@@ -3707,6 +3707,36 @@
           <a:chExt cx="0" cy="0"/>
         </a:xfrm>
       </p:grpSpPr>
+      <p:pic>
+        <p:nvPicPr>
+          <p:cNvPr id="11" name="Image 10"/>
+          <p:cNvPicPr>
+            <a:picLocks noChangeAspect="1"/>
+          </p:cNvPicPr>
+          <p:nvPr/>
+        </p:nvPicPr>
+        <p:blipFill>
+          <a:blip r:embed="rId3">
+            <a:extLst>
+              <a:ext uri="{28A0092B-C50C-407E-A947-70E740481C1C}">
+                <a14:useLocalDpi xmlns:a14="http://schemas.microsoft.com/office/drawing/2010/main" val="0"/>
+              </a:ext>
+            </a:extLst>
+          </a:blip>
+          <a:stretch>
+            <a:fillRect/>
+          </a:stretch>
+        </p:blipFill>
+        <p:spPr>
+          <a:xfrm>
+            <a:off x="35630985" y="5112769"/>
+            <a:ext cx="14648516" cy="8783018"/>
+          </a:xfrm>
+          <a:prstGeom prst="rect">
+            <a:avLst/>
+          </a:prstGeom>
+        </p:spPr>
+      </p:pic>
       <p:sp>
         <p:nvSpPr>
           <p:cNvPr id="2" name="Titel 1"/>
@@ -4451,7 +4481,7 @@
           <p:nvPr/>
         </p:nvPicPr>
         <p:blipFill>
-          <a:blip r:embed="rId3" cstate="print">
+          <a:blip r:embed="rId4" cstate="print">
             <a:extLst>
               <a:ext uri="{28A0092B-C50C-407E-A947-70E740481C1C}">
                 <a14:useLocalDpi xmlns:a14="http://schemas.microsoft.com/office/drawing/2010/main" val="0"/>
@@ -4654,7 +4684,7 @@
           <p:nvPr/>
         </p:nvPicPr>
         <p:blipFill>
-          <a:blip r:embed="rId4">
+          <a:blip r:embed="rId5">
             <a:extLst>
               <a:ext uri="{28A0092B-C50C-407E-A947-70E740481C1C}">
                 <a14:useLocalDpi xmlns:a14="http://schemas.microsoft.com/office/drawing/2010/main" val="0"/>
@@ -4675,36 +4705,6 @@
           </a:prstGeom>
         </p:spPr>
       </p:pic>
-      <p:pic>
-        <p:nvPicPr>
-          <p:cNvPr id="96" name="Image 95"/>
-          <p:cNvPicPr>
-            <a:picLocks noChangeAspect="1"/>
-          </p:cNvPicPr>
-          <p:nvPr/>
-        </p:nvPicPr>
-        <p:blipFill>
-          <a:blip r:embed="rId5">
-            <a:extLst>
-              <a:ext uri="{28A0092B-C50C-407E-A947-70E740481C1C}">
-                <a14:useLocalDpi xmlns:a14="http://schemas.microsoft.com/office/drawing/2010/main" val="0"/>
-              </a:ext>
-            </a:extLst>
-          </a:blip>
-          <a:stretch>
-            <a:fillRect/>
-          </a:stretch>
-        </p:blipFill>
-        <p:spPr>
-          <a:xfrm>
-            <a:off x="15597565" y="21964971"/>
-            <a:ext cx="19366675" cy="5398269"/>
-          </a:xfrm>
-          <a:prstGeom prst="rect">
-            <a:avLst/>
-          </a:prstGeom>
-        </p:spPr>
-      </p:pic>
       <p:sp>
         <p:nvSpPr>
           <p:cNvPr id="6" name="Rectangle 5"/>
@@ -4908,7 +4908,6 @@
               <a:rPr lang="en-US" sz="3800" dirty="0"/>
               <a:t>to be free of artifacts, we also assume their variance to be significantly smaller than windows with artifacts.</a:t>
             </a:r>
-            <a:endParaRPr lang="en-US" sz="3800" dirty="0"/>
           </a:p>
           <a:p>
             <a:pPr algn="just"/>
@@ -4984,15 +4983,7 @@
             </a:r>
             <a:r>
               <a:rPr lang="en-US" sz="3800" dirty="0" smtClean="0"/>
-              <a:t> </a:t>
-            </a:r>
-            <a:r>
-              <a:rPr lang="en-US" sz="3800" dirty="0" smtClean="0"/>
-              <a:t>artifacts are si</a:t>
-            </a:r>
-            <a:r>
-              <a:rPr lang="en-US" sz="3800" dirty="0" smtClean="0"/>
-              <a:t>mulated </a:t>
+              <a:t> artifacts are simulated </a:t>
             </a:r>
             <a:r>
               <a:rPr lang="en-US" sz="4000" dirty="0"/>
@@ -5004,27 +4995,7 @@
             </a:r>
             <a:r>
               <a:rPr lang="en-US" sz="3800" dirty="0" smtClean="0"/>
-              <a:t>randomly </a:t>
-            </a:r>
-            <a:r>
-              <a:rPr lang="en-US" sz="3800" dirty="0" smtClean="0"/>
-              <a:t>added to the testing </a:t>
-            </a:r>
-            <a:r>
-              <a:rPr lang="en-US" sz="3800" dirty="0" smtClean="0"/>
-              <a:t>set. </a:t>
-            </a:r>
-            <a:r>
-              <a:rPr lang="en-US" sz="3800" dirty="0" smtClean="0"/>
-              <a:t>Each channel is affected differently, the amplitude of the artifact being smaller when the channel’s sensor is far from the source of the artifact. This one is the most affected </a:t>
-            </a:r>
-            <a:r>
-              <a:rPr lang="en-US" sz="3800" dirty="0" smtClean="0"/>
-              <a:t>channel (same o, </a:t>
-            </a:r>
-            <a:r>
-              <a:rPr lang="en-US" sz="3800" dirty="0" smtClean="0"/>
-              <a:t>with artifact over 20 samples, and an amplitude 8 time bigger than the original.</a:t>
+              <a:t>randomly added to the testing set. Each channel is affected differently, the amplitude of the artifact being smaller when the channel’s sensor is far from the source of the artifact. This one is the most affected channel (same o, with artifact over 20 samples, and an amplitude 8 time bigger than the original.</a:t>
             </a:r>
             <a:endParaRPr lang="en-US" sz="3800" dirty="0"/>
           </a:p>
@@ -5038,8 +5009,8 @@
         </p:nvSpPr>
         <p:spPr>
           <a:xfrm>
-            <a:off x="36108321" y="13825736"/>
-            <a:ext cx="14140100" cy="1261884"/>
+            <a:off x="35531496" y="13825736"/>
+            <a:ext cx="14748005" cy="1261884"/>
           </a:xfrm>
           <a:prstGeom prst="rect">
             <a:avLst/>
@@ -5061,7 +5032,11 @@
             </a:r>
             <a:r>
               <a:rPr lang="en-US" sz="3800" dirty="0" smtClean="0"/>
-              <a:t> cross-validation between thresholds and window size on a 1400 sample dataset. A window size of 40 is optimal.</a:t>
+              <a:t> cross-validation between thresholds and window size on a 1400 sample dataset. A window size of </a:t>
+            </a:r>
+            <a:r>
+              <a:rPr lang="en-US" sz="3800" dirty="0" smtClean="0"/>
+              <a:t>230 with MAX threshold is optimal.</a:t>
             </a:r>
             <a:endParaRPr lang="en-US" sz="3800" dirty="0"/>
           </a:p>
@@ -5076,7 +5051,7 @@
           <p:nvPr>
             <p:extLst>
               <p:ext uri="{D42A27DB-BD31-4B8C-83A1-F6EECF244321}">
-                <p14:modId xmlns:p14="http://schemas.microsoft.com/office/powerpoint/2010/main" val="3258492"/>
+                <p14:modId xmlns:p14="http://schemas.microsoft.com/office/powerpoint/2010/main" val="1385931454"/>
               </p:ext>
             </p:extLst>
           </p:nvPr>
@@ -5196,8 +5171,8 @@
                     <a:lstStyle/>
                     <a:p>
                       <a:r>
-                        <a:rPr lang="fr-FR" sz="4400" dirty="0" smtClean="0"/>
-                        <a:t>0.92</a:t>
+                        <a:rPr lang="fr-FR" sz="4400" smtClean="0"/>
+                        <a:t>1.0</a:t>
                       </a:r>
                       <a:endParaRPr lang="fr-FR" sz="4400" dirty="0"/>
                     </a:p>
@@ -5460,36 +5435,6 @@
           </a:fontRef>
         </p:style>
       </p:cxnSp>
-      <p:pic>
-        <p:nvPicPr>
-          <p:cNvPr id="108" name="Image 107"/>
-          <p:cNvPicPr>
-            <a:picLocks noChangeAspect="1"/>
-          </p:cNvPicPr>
-          <p:nvPr/>
-        </p:nvPicPr>
-        <p:blipFill>
-          <a:blip r:embed="rId6">
-            <a:extLst>
-              <a:ext uri="{28A0092B-C50C-407E-A947-70E740481C1C}">
-                <a14:useLocalDpi xmlns:a14="http://schemas.microsoft.com/office/drawing/2010/main" val="0"/>
-              </a:ext>
-            </a:extLst>
-          </a:blip>
-          <a:stretch>
-            <a:fillRect/>
-          </a:stretch>
-        </p:blipFill>
-        <p:spPr>
-          <a:xfrm>
-            <a:off x="37659630" y="6120880"/>
-            <a:ext cx="10458865" cy="7652045"/>
-          </a:xfrm>
-          <a:prstGeom prst="rect">
-            <a:avLst/>
-          </a:prstGeom>
-        </p:spPr>
-      </p:pic>
       <p:sp>
         <p:nvSpPr>
           <p:cNvPr id="3" name="ZoneTexte 2"/>
@@ -5572,13 +5517,13 @@
             </a:r>
             <a:r>
               <a:rPr lang="en-US" sz="3000" dirty="0">
-                <a:hlinkClick r:id="rId7"/>
+                <a:hlinkClick r:id="rId6"/>
               </a:rPr>
               <a:t>https://</a:t>
             </a:r>
             <a:r>
               <a:rPr lang="en-US" sz="3000" dirty="0" smtClean="0">
-                <a:hlinkClick r:id="rId7"/>
+                <a:hlinkClick r:id="rId6"/>
               </a:rPr>
               <a:t>github.com/codehunks/emotiv/tree/master/csv-eeg-data</a:t>
             </a:r>
@@ -5789,7 +5734,7 @@
             <p:nvPr/>
           </p:nvPicPr>
           <p:blipFill>
-            <a:blip r:embed="rId8">
+            <a:blip r:embed="rId7">
               <a:extLst>
                 <a:ext uri="{28A0092B-C50C-407E-A947-70E740481C1C}">
                   <a14:useLocalDpi xmlns:a14="http://schemas.microsoft.com/office/drawing/2010/main" val="0"/>
@@ -6007,103 +5952,11 @@
             <a:pPr algn="just"/>
             <a:r>
               <a:rPr lang="en-US" sz="3800" dirty="0" smtClean="0"/>
-              <a:t>Several parameters can be adjusted, starting by the size of the windows. Cross validation for each threshold indicates the window size with the best results. Standard error measure has been preferred to mean squared error WHY </a:t>
-            </a:r>
-            <a:r>
-              <a:rPr lang="en-US" sz="3800" dirty="0" err="1" smtClean="0"/>
-              <a:t>WHY</a:t>
+              <a:t>Several parameters can be adjusted, starting by the size of the windows. </a:t>
             </a:r>
             <a:r>
               <a:rPr lang="en-US" sz="3800" dirty="0" smtClean="0"/>
-              <a:t> </a:t>
-            </a:r>
-            <a:r>
-              <a:rPr lang="en-US" sz="3800" dirty="0" err="1" smtClean="0"/>
-              <a:t>WHY</a:t>
-            </a:r>
-            <a:r>
-              <a:rPr lang="en-US" sz="3800" dirty="0" smtClean="0"/>
-              <a:t> </a:t>
-            </a:r>
-            <a:r>
-              <a:rPr lang="en-US" sz="3800" dirty="0" err="1" smtClean="0"/>
-              <a:t>WHY</a:t>
-            </a:r>
-            <a:r>
-              <a:rPr lang="en-US" sz="3800" dirty="0" smtClean="0"/>
-              <a:t> </a:t>
-            </a:r>
-            <a:r>
-              <a:rPr lang="en-US" sz="3800" dirty="0" err="1" smtClean="0"/>
-              <a:t>WHY</a:t>
-            </a:r>
-            <a:r>
-              <a:rPr lang="en-US" sz="3800" dirty="0" smtClean="0"/>
-              <a:t> </a:t>
-            </a:r>
-            <a:r>
-              <a:rPr lang="en-US" sz="3800" dirty="0" err="1" smtClean="0"/>
-              <a:t>WHY</a:t>
-            </a:r>
-            <a:r>
-              <a:rPr lang="en-US" sz="3800" dirty="0" smtClean="0"/>
-              <a:t> </a:t>
-            </a:r>
-            <a:r>
-              <a:rPr lang="en-US" sz="3800" dirty="0" err="1" smtClean="0"/>
-              <a:t>WHY</a:t>
-            </a:r>
-            <a:r>
-              <a:rPr lang="en-US" sz="3800" dirty="0" smtClean="0"/>
-              <a:t> </a:t>
-            </a:r>
-            <a:r>
-              <a:rPr lang="en-US" sz="3800" dirty="0" err="1" smtClean="0"/>
-              <a:t>WHY</a:t>
-            </a:r>
-            <a:r>
-              <a:rPr lang="en-US" sz="3800" dirty="0" smtClean="0"/>
-              <a:t> </a:t>
-            </a:r>
-            <a:r>
-              <a:rPr lang="en-US" sz="3800" dirty="0" err="1" smtClean="0"/>
-              <a:t>WHY</a:t>
-            </a:r>
-            <a:r>
-              <a:rPr lang="en-US" sz="3800" dirty="0" smtClean="0"/>
-              <a:t> </a:t>
-            </a:r>
-            <a:r>
-              <a:rPr lang="en-US" sz="3800" dirty="0" err="1" smtClean="0"/>
-              <a:t>WHY</a:t>
-            </a:r>
-            <a:r>
-              <a:rPr lang="en-US" sz="3800" dirty="0" smtClean="0"/>
-              <a:t> </a:t>
-            </a:r>
-            <a:r>
-              <a:rPr lang="en-US" sz="3800" dirty="0" err="1" smtClean="0"/>
-              <a:t>WHY</a:t>
-            </a:r>
-            <a:r>
-              <a:rPr lang="en-US" sz="3800" dirty="0" smtClean="0"/>
-              <a:t> </a:t>
-            </a:r>
-            <a:r>
-              <a:rPr lang="en-US" sz="3800" dirty="0" err="1" smtClean="0"/>
-              <a:t>WHY</a:t>
-            </a:r>
-            <a:r>
-              <a:rPr lang="en-US" sz="3800" dirty="0" smtClean="0"/>
-              <a:t> </a:t>
-            </a:r>
-            <a:r>
-              <a:rPr lang="en-US" sz="3800" dirty="0" err="1" smtClean="0"/>
-              <a:t>WHY</a:t>
-            </a:r>
-            <a:r>
-              <a:rPr lang="en-US" sz="3800" dirty="0" smtClean="0"/>
-              <a:t>.</a:t>
+              <a:t>This is why it has been cross validated for each threshold using the mean square error as performance measure to see how much the reconstructed dataset differs from the original one.</a:t>
             </a:r>
             <a:endParaRPr lang="en-US" sz="3800" dirty="0"/>
           </a:p>
@@ -6133,16 +5986,42 @@
             <a:pPr algn="just"/>
             <a:r>
               <a:rPr lang="en-US" sz="3800" dirty="0" smtClean="0"/>
-              <a:t>For a window with no artifacts, no component should be removed, so that reconstructed and original window are </a:t>
-            </a:r>
-            <a:r>
-              <a:rPr lang="en-US" sz="3800" dirty="0" smtClean="0"/>
-              <a:t>identical, and we want artifacts to be systematically removed.</a:t>
+              <a:t>For a window with no artifacts, no component should be removed, so that reconstructed and original window are identical, and we want artifacts to be systematically removed.</a:t>
             </a:r>
             <a:endParaRPr lang="en-US" sz="3800" dirty="0"/>
           </a:p>
         </p:txBody>
       </p:sp>
+      <p:pic>
+        <p:nvPicPr>
+          <p:cNvPr id="9" name="Image 8"/>
+          <p:cNvPicPr>
+            <a:picLocks noChangeAspect="1"/>
+          </p:cNvPicPr>
+          <p:nvPr/>
+        </p:nvPicPr>
+        <p:blipFill>
+          <a:blip r:embed="rId8">
+            <a:extLst>
+              <a:ext uri="{28A0092B-C50C-407E-A947-70E740481C1C}">
+                <a14:useLocalDpi xmlns:a14="http://schemas.microsoft.com/office/drawing/2010/main" val="0"/>
+              </a:ext>
+            </a:extLst>
+          </a:blip>
+          <a:stretch>
+            <a:fillRect/>
+          </a:stretch>
+        </p:blipFill>
+        <p:spPr>
+          <a:xfrm>
+            <a:off x="15833767" y="22197555"/>
+            <a:ext cx="18563218" cy="5271953"/>
+          </a:xfrm>
+          <a:prstGeom prst="rect">
+            <a:avLst/>
+          </a:prstGeom>
+        </p:spPr>
+      </p:pic>
     </p:spTree>
     <p:extLst>
       <p:ext uri="{BB962C8B-B14F-4D97-AF65-F5344CB8AC3E}">

</xml_diff>